<commit_message>
Added example for managing 2 batteries using one device
</commit_message>
<xml_diff>
--- a/docs/slides.pptx
+++ b/docs/slides.pptx
@@ -6,7 +6,8 @@
   </p:sldMasterIdLst>
   <p:sldIdLst>
     <p:sldId id="258" r:id="rId2"/>
-    <p:sldId id="259" r:id="rId3"/>
+    <p:sldId id="260" r:id="rId3"/>
+    <p:sldId id="259" r:id="rId4"/>
   </p:sldIdLst>
   <p:sldSz cx="12192000" cy="6858000"/>
   <p:notesSz cx="6858000" cy="9144000"/>
@@ -260,7 +261,7 @@
           <a:p>
             <a:fld id="{4F735CCE-55D4-41A9-BDB8-A4CE9CB703D2}" type="datetimeFigureOut">
               <a:rPr lang="en-US" smtClean="0"/>
-              <a:t>12/7/2025</a:t>
+              <a:t>12/9/2025</a:t>
             </a:fld>
             <a:endParaRPr lang="en-US"/>
           </a:p>
@@ -458,7 +459,7 @@
           <a:p>
             <a:fld id="{4F735CCE-55D4-41A9-BDB8-A4CE9CB703D2}" type="datetimeFigureOut">
               <a:rPr lang="en-US" smtClean="0"/>
-              <a:t>12/7/2025</a:t>
+              <a:t>12/9/2025</a:t>
             </a:fld>
             <a:endParaRPr lang="en-US"/>
           </a:p>
@@ -666,7 +667,7 @@
           <a:p>
             <a:fld id="{4F735CCE-55D4-41A9-BDB8-A4CE9CB703D2}" type="datetimeFigureOut">
               <a:rPr lang="en-US" smtClean="0"/>
-              <a:t>12/7/2025</a:t>
+              <a:t>12/9/2025</a:t>
             </a:fld>
             <a:endParaRPr lang="en-US"/>
           </a:p>
@@ -864,7 +865,7 @@
           <a:p>
             <a:fld id="{4F735CCE-55D4-41A9-BDB8-A4CE9CB703D2}" type="datetimeFigureOut">
               <a:rPr lang="en-US" smtClean="0"/>
-              <a:t>12/7/2025</a:t>
+              <a:t>12/9/2025</a:t>
             </a:fld>
             <a:endParaRPr lang="en-US"/>
           </a:p>
@@ -1139,7 +1140,7 @@
           <a:p>
             <a:fld id="{4F735CCE-55D4-41A9-BDB8-A4CE9CB703D2}" type="datetimeFigureOut">
               <a:rPr lang="en-US" smtClean="0"/>
-              <a:t>12/7/2025</a:t>
+              <a:t>12/9/2025</a:t>
             </a:fld>
             <a:endParaRPr lang="en-US"/>
           </a:p>
@@ -1404,7 +1405,7 @@
           <a:p>
             <a:fld id="{4F735CCE-55D4-41A9-BDB8-A4CE9CB703D2}" type="datetimeFigureOut">
               <a:rPr lang="en-US" smtClean="0"/>
-              <a:t>12/7/2025</a:t>
+              <a:t>12/9/2025</a:t>
             </a:fld>
             <a:endParaRPr lang="en-US"/>
           </a:p>
@@ -1816,7 +1817,7 @@
           <a:p>
             <a:fld id="{4F735CCE-55D4-41A9-BDB8-A4CE9CB703D2}" type="datetimeFigureOut">
               <a:rPr lang="en-US" smtClean="0"/>
-              <a:t>12/7/2025</a:t>
+              <a:t>12/9/2025</a:t>
             </a:fld>
             <a:endParaRPr lang="en-US"/>
           </a:p>
@@ -1957,7 +1958,7 @@
           <a:p>
             <a:fld id="{4F735CCE-55D4-41A9-BDB8-A4CE9CB703D2}" type="datetimeFigureOut">
               <a:rPr lang="en-US" smtClean="0"/>
-              <a:t>12/7/2025</a:t>
+              <a:t>12/9/2025</a:t>
             </a:fld>
             <a:endParaRPr lang="en-US"/>
           </a:p>
@@ -2070,7 +2071,7 @@
           <a:p>
             <a:fld id="{4F735CCE-55D4-41A9-BDB8-A4CE9CB703D2}" type="datetimeFigureOut">
               <a:rPr lang="en-US" smtClean="0"/>
-              <a:t>12/7/2025</a:t>
+              <a:t>12/9/2025</a:t>
             </a:fld>
             <a:endParaRPr lang="en-US"/>
           </a:p>
@@ -2381,7 +2382,7 @@
           <a:p>
             <a:fld id="{4F735CCE-55D4-41A9-BDB8-A4CE9CB703D2}" type="datetimeFigureOut">
               <a:rPr lang="en-US" smtClean="0"/>
-              <a:t>12/7/2025</a:t>
+              <a:t>12/9/2025</a:t>
             </a:fld>
             <a:endParaRPr lang="en-US"/>
           </a:p>
@@ -2669,7 +2670,7 @@
           <a:p>
             <a:fld id="{4F735CCE-55D4-41A9-BDB8-A4CE9CB703D2}" type="datetimeFigureOut">
               <a:rPr lang="en-US" smtClean="0"/>
-              <a:t>12/7/2025</a:t>
+              <a:t>12/9/2025</a:t>
             </a:fld>
             <a:endParaRPr lang="en-US"/>
           </a:p>
@@ -2910,7 +2911,7 @@
           <a:p>
             <a:fld id="{4F735CCE-55D4-41A9-BDB8-A4CE9CB703D2}" type="datetimeFigureOut">
               <a:rPr lang="en-US" smtClean="0"/>
-              <a:t>12/7/2025</a:t>
+              <a:t>12/9/2025</a:t>
             </a:fld>
             <a:endParaRPr lang="en-US"/>
           </a:p>
@@ -4014,6 +4015,715 @@
 </file>
 
 <file path=ppt/slides/slide2.xml><?xml version="1.0" encoding="utf-8"?>
+<p:sld xmlns:a="http://schemas.openxmlformats.org/drawingml/2006/main" xmlns:r="http://schemas.openxmlformats.org/officeDocument/2006/relationships" xmlns:p="http://schemas.openxmlformats.org/presentationml/2006/main">
+  <p:cSld>
+    <p:spTree>
+      <p:nvGrpSpPr>
+        <p:cNvPr id="1" name="">
+          <a:extLst>
+            <a:ext uri="{FF2B5EF4-FFF2-40B4-BE49-F238E27FC236}">
+              <a16:creationId xmlns:a16="http://schemas.microsoft.com/office/drawing/2014/main" id="{6B94433E-B064-6C35-260A-98E981B0EB7A}"/>
+            </a:ext>
+          </a:extLst>
+        </p:cNvPr>
+        <p:cNvGrpSpPr/>
+        <p:nvPr/>
+      </p:nvGrpSpPr>
+      <p:grpSpPr>
+        <a:xfrm>
+          <a:off x="0" y="0"/>
+          <a:ext cx="0" cy="0"/>
+          <a:chOff x="0" y="0"/>
+          <a:chExt cx="0" cy="0"/>
+        </a:xfrm>
+      </p:grpSpPr>
+      <p:grpSp>
+        <p:nvGrpSpPr>
+          <p:cNvPr id="29" name="Group 28">
+            <a:extLst>
+              <a:ext uri="{FF2B5EF4-FFF2-40B4-BE49-F238E27FC236}">
+                <a16:creationId xmlns:a16="http://schemas.microsoft.com/office/drawing/2014/main" id="{0E945597-7703-DCA5-63B2-89FF39D37E6C}"/>
+              </a:ext>
+            </a:extLst>
+          </p:cNvPr>
+          <p:cNvGrpSpPr/>
+          <p:nvPr/>
+        </p:nvGrpSpPr>
+        <p:grpSpPr>
+          <a:xfrm>
+            <a:off x="1756326" y="436235"/>
+            <a:ext cx="9372977" cy="6267566"/>
+            <a:chOff x="1756326" y="436235"/>
+            <a:chExt cx="9372977" cy="6267566"/>
+          </a:xfrm>
+        </p:grpSpPr>
+        <p:sp>
+          <p:nvSpPr>
+            <p:cNvPr id="12" name="Freeform: Shape 11">
+              <a:extLst>
+                <a:ext uri="{FF2B5EF4-FFF2-40B4-BE49-F238E27FC236}">
+                  <a16:creationId xmlns:a16="http://schemas.microsoft.com/office/drawing/2014/main" id="{65FF1D18-C189-BA88-787D-56587E273232}"/>
+                </a:ext>
+              </a:extLst>
+            </p:cNvPr>
+            <p:cNvSpPr/>
+            <p:nvPr/>
+          </p:nvSpPr>
+          <p:spPr>
+            <a:xfrm>
+              <a:off x="2397360" y="1181100"/>
+              <a:ext cx="2803290" cy="2973885"/>
+            </a:xfrm>
+            <a:custGeom>
+              <a:avLst/>
+              <a:gdLst>
+                <a:gd name="connsiteX0" fmla="*/ 679215 w 2803290"/>
+                <a:gd name="connsiteY0" fmla="*/ 2276475 h 2276475"/>
+                <a:gd name="connsiteX1" fmla="*/ 126765 w 2803290"/>
+                <a:gd name="connsiteY1" fmla="*/ 447675 h 2276475"/>
+                <a:gd name="connsiteX2" fmla="*/ 2803290 w 2803290"/>
+                <a:gd name="connsiteY2" fmla="*/ 0 h 2276475"/>
+              </a:gdLst>
+              <a:ahLst/>
+              <a:cxnLst>
+                <a:cxn ang="0">
+                  <a:pos x="connsiteX0" y="connsiteY0"/>
+                </a:cxn>
+                <a:cxn ang="0">
+                  <a:pos x="connsiteX1" y="connsiteY1"/>
+                </a:cxn>
+                <a:cxn ang="0">
+                  <a:pos x="connsiteX2" y="connsiteY2"/>
+                </a:cxn>
+              </a:cxnLst>
+              <a:rect l="l" t="t" r="r" b="b"/>
+              <a:pathLst>
+                <a:path w="2803290" h="2276475">
+                  <a:moveTo>
+                    <a:pt x="679215" y="2276475"/>
+                  </a:moveTo>
+                  <a:cubicBezTo>
+                    <a:pt x="225983" y="1551781"/>
+                    <a:pt x="-227248" y="827088"/>
+                    <a:pt x="126765" y="447675"/>
+                  </a:cubicBezTo>
+                  <a:cubicBezTo>
+                    <a:pt x="480778" y="68262"/>
+                    <a:pt x="1642034" y="34131"/>
+                    <a:pt x="2803290" y="0"/>
+                  </a:cubicBezTo>
+                </a:path>
+              </a:pathLst>
+            </a:custGeom>
+            <a:noFill/>
+            <a:ln w="38100">
+              <a:solidFill>
+                <a:schemeClr val="accent3"/>
+              </a:solidFill>
+              <a:prstDash val="sysDash"/>
+              <a:tailEnd type="triangle"/>
+            </a:ln>
+          </p:spPr>
+          <p:style>
+            <a:lnRef idx="2">
+              <a:schemeClr val="accent1">
+                <a:shade val="15000"/>
+              </a:schemeClr>
+            </a:lnRef>
+            <a:fillRef idx="1">
+              <a:schemeClr val="accent1"/>
+            </a:fillRef>
+            <a:effectRef idx="0">
+              <a:schemeClr val="accent1"/>
+            </a:effectRef>
+            <a:fontRef idx="minor">
+              <a:schemeClr val="lt1"/>
+            </a:fontRef>
+          </p:style>
+          <p:txBody>
+            <a:bodyPr rtlCol="0" anchor="ctr"/>
+            <a:lstStyle/>
+            <a:p>
+              <a:pPr algn="ctr"/>
+              <a:endParaRPr lang="en-US"/>
+            </a:p>
+          </p:txBody>
+        </p:sp>
+        <p:pic>
+          <p:nvPicPr>
+            <p:cNvPr id="5" name="Picture 4">
+              <a:extLst>
+                <a:ext uri="{FF2B5EF4-FFF2-40B4-BE49-F238E27FC236}">
+                  <a16:creationId xmlns:a16="http://schemas.microsoft.com/office/drawing/2014/main" id="{F309AB5A-4E8E-96C7-75F4-8D98F57D3E75}"/>
+                </a:ext>
+              </a:extLst>
+            </p:cNvPr>
+            <p:cNvPicPr>
+              <a:picLocks noChangeAspect="1"/>
+            </p:cNvPicPr>
+            <p:nvPr/>
+          </p:nvPicPr>
+          <p:blipFill>
+            <a:blip r:embed="rId2">
+              <a:extLst>
+                <a:ext uri="{28A0092B-C50C-407E-A947-70E740481C1C}">
+                  <a14:useLocalDpi xmlns:a14="http://schemas.microsoft.com/office/drawing/2010/main" val="0"/>
+                </a:ext>
+              </a:extLst>
+            </a:blip>
+            <a:stretch>
+              <a:fillRect/>
+            </a:stretch>
+          </p:blipFill>
+          <p:spPr>
+            <a:xfrm>
+              <a:off x="6668033" y="1209233"/>
+              <a:ext cx="3116850" cy="5212532"/>
+            </a:xfrm>
+            <a:prstGeom prst="rect">
+              <a:avLst/>
+            </a:prstGeom>
+            <a:effectLst>
+              <a:outerShdw blurRad="177800" dist="38100" dir="5400000" sx="103000" sy="103000" algn="t" rotWithShape="0">
+                <a:prstClr val="black">
+                  <a:alpha val="40000"/>
+                </a:prstClr>
+              </a:outerShdw>
+            </a:effectLst>
+          </p:spPr>
+        </p:pic>
+        <p:pic>
+          <p:nvPicPr>
+            <p:cNvPr id="3" name="Picture 2">
+              <a:extLst>
+                <a:ext uri="{FF2B5EF4-FFF2-40B4-BE49-F238E27FC236}">
+                  <a16:creationId xmlns:a16="http://schemas.microsoft.com/office/drawing/2014/main" id="{BA070D71-4C26-C1B0-5DE4-ADE9562A1C59}"/>
+                </a:ext>
+              </a:extLst>
+            </p:cNvPr>
+            <p:cNvPicPr>
+              <a:picLocks noChangeAspect="1"/>
+            </p:cNvPicPr>
+            <p:nvPr/>
+          </p:nvPicPr>
+          <p:blipFill>
+            <a:blip r:embed="rId3">
+              <a:extLst>
+                <a:ext uri="{28A0092B-C50C-407E-A947-70E740481C1C}">
+                  <a14:useLocalDpi xmlns:a14="http://schemas.microsoft.com/office/drawing/2010/main" val="0"/>
+                </a:ext>
+              </a:extLst>
+            </a:blip>
+            <a:stretch>
+              <a:fillRect/>
+            </a:stretch>
+          </p:blipFill>
+          <p:spPr>
+            <a:xfrm>
+              <a:off x="7981970" y="436235"/>
+              <a:ext cx="3147333" cy="2552921"/>
+            </a:xfrm>
+            <a:prstGeom prst="rect">
+              <a:avLst/>
+            </a:prstGeom>
+            <a:effectLst>
+              <a:outerShdw blurRad="177800" dist="38100" dir="5400000" sx="103000" sy="103000" algn="t" rotWithShape="0">
+                <a:prstClr val="black">
+                  <a:alpha val="40000"/>
+                </a:prstClr>
+              </a:outerShdw>
+            </a:effectLst>
+          </p:spPr>
+        </p:pic>
+        <p:pic>
+          <p:nvPicPr>
+            <p:cNvPr id="7" name="Picture 6">
+              <a:extLst>
+                <a:ext uri="{FF2B5EF4-FFF2-40B4-BE49-F238E27FC236}">
+                  <a16:creationId xmlns:a16="http://schemas.microsoft.com/office/drawing/2014/main" id="{AD9C46F3-90A8-ACF3-F15B-D493EFCE5AF8}"/>
+                </a:ext>
+              </a:extLst>
+            </p:cNvPr>
+            <p:cNvPicPr>
+              <a:picLocks noChangeAspect="1"/>
+            </p:cNvPicPr>
+            <p:nvPr/>
+          </p:nvPicPr>
+          <p:blipFill>
+            <a:blip r:embed="rId4"/>
+            <a:stretch>
+              <a:fillRect/>
+            </a:stretch>
+          </p:blipFill>
+          <p:spPr>
+            <a:xfrm>
+              <a:off x="1855823" y="3784831"/>
+              <a:ext cx="2542945" cy="2918970"/>
+            </a:xfrm>
+            <a:prstGeom prst="rect">
+              <a:avLst/>
+            </a:prstGeom>
+          </p:spPr>
+        </p:pic>
+        <p:grpSp>
+          <p:nvGrpSpPr>
+            <p:cNvPr id="11" name="Group 10">
+              <a:extLst>
+                <a:ext uri="{FF2B5EF4-FFF2-40B4-BE49-F238E27FC236}">
+                  <a16:creationId xmlns:a16="http://schemas.microsoft.com/office/drawing/2014/main" id="{F6063694-F7F5-E219-043F-527886087A7C}"/>
+                </a:ext>
+              </a:extLst>
+            </p:cNvPr>
+            <p:cNvGrpSpPr/>
+            <p:nvPr/>
+          </p:nvGrpSpPr>
+          <p:grpSpPr>
+            <a:xfrm>
+              <a:off x="5309950" y="436235"/>
+              <a:ext cx="1572100" cy="1572100"/>
+              <a:chOff x="2329508" y="1349121"/>
+              <a:chExt cx="1572100" cy="1572100"/>
+            </a:xfrm>
+          </p:grpSpPr>
+          <p:sp>
+            <p:nvSpPr>
+              <p:cNvPr id="10" name="Rectangle: Rounded Corners 9">
+                <a:extLst>
+                  <a:ext uri="{FF2B5EF4-FFF2-40B4-BE49-F238E27FC236}">
+                    <a16:creationId xmlns:a16="http://schemas.microsoft.com/office/drawing/2014/main" id="{CEC39AAE-8F2D-BD8A-C490-9CC0C05ECCB5}"/>
+                  </a:ext>
+                </a:extLst>
+              </p:cNvPr>
+              <p:cNvSpPr/>
+              <p:nvPr/>
+            </p:nvSpPr>
+            <p:spPr>
+              <a:xfrm>
+                <a:off x="2441542" y="1461155"/>
+                <a:ext cx="1348033" cy="1348033"/>
+              </a:xfrm>
+              <a:prstGeom prst="roundRect">
+                <a:avLst/>
+              </a:prstGeom>
+              <a:solidFill>
+                <a:schemeClr val="bg1"/>
+              </a:solidFill>
+              <a:effectLst>
+                <a:outerShdw blurRad="177800" dist="38100" dir="5400000" sx="103000" sy="103000" algn="t" rotWithShape="0">
+                  <a:prstClr val="black">
+                    <a:alpha val="40000"/>
+                  </a:prstClr>
+                </a:outerShdw>
+              </a:effectLst>
+            </p:spPr>
+            <p:style>
+              <a:lnRef idx="2">
+                <a:schemeClr val="accent1">
+                  <a:shade val="15000"/>
+                </a:schemeClr>
+              </a:lnRef>
+              <a:fillRef idx="1">
+                <a:schemeClr val="accent1"/>
+              </a:fillRef>
+              <a:effectRef idx="0">
+                <a:schemeClr val="accent1"/>
+              </a:effectRef>
+              <a:fontRef idx="minor">
+                <a:schemeClr val="lt1"/>
+              </a:fontRef>
+            </p:style>
+            <p:txBody>
+              <a:bodyPr rtlCol="0" anchor="ctr"/>
+              <a:lstStyle/>
+              <a:p>
+                <a:pPr algn="ctr"/>
+                <a:endParaRPr lang="en-US"/>
+              </a:p>
+            </p:txBody>
+          </p:sp>
+          <p:pic>
+            <p:nvPicPr>
+              <p:cNvPr id="9" name="Picture 8">
+                <a:extLst>
+                  <a:ext uri="{FF2B5EF4-FFF2-40B4-BE49-F238E27FC236}">
+                    <a16:creationId xmlns:a16="http://schemas.microsoft.com/office/drawing/2014/main" id="{1225B6E4-A256-C10F-5FD1-3DFB51A96124}"/>
+                  </a:ext>
+                </a:extLst>
+              </p:cNvPr>
+              <p:cNvPicPr>
+                <a:picLocks noChangeAspect="1"/>
+              </p:cNvPicPr>
+              <p:nvPr/>
+            </p:nvPicPr>
+            <p:blipFill>
+              <a:blip r:embed="rId5">
+                <a:extLst>
+                  <a:ext uri="{28A0092B-C50C-407E-A947-70E740481C1C}">
+                    <a14:useLocalDpi xmlns:a14="http://schemas.microsoft.com/office/drawing/2010/main" val="0"/>
+                  </a:ext>
+                </a:extLst>
+              </a:blip>
+              <a:stretch>
+                <a:fillRect/>
+              </a:stretch>
+            </p:blipFill>
+            <p:spPr>
+              <a:xfrm>
+                <a:off x="2329508" y="1349121"/>
+                <a:ext cx="1572100" cy="1572100"/>
+              </a:xfrm>
+              <a:prstGeom prst="rect">
+                <a:avLst/>
+              </a:prstGeom>
+            </p:spPr>
+          </p:pic>
+        </p:grpSp>
+        <p:sp>
+          <p:nvSpPr>
+            <p:cNvPr id="13" name="TextBox 12">
+              <a:extLst>
+                <a:ext uri="{FF2B5EF4-FFF2-40B4-BE49-F238E27FC236}">
+                  <a16:creationId xmlns:a16="http://schemas.microsoft.com/office/drawing/2014/main" id="{6AA23F15-FEF3-A611-ABBA-507F4FEAE605}"/>
+                </a:ext>
+              </a:extLst>
+            </p:cNvPr>
+            <p:cNvSpPr txBox="1"/>
+            <p:nvPr/>
+          </p:nvSpPr>
+          <p:spPr>
+            <a:xfrm>
+              <a:off x="5586630" y="1996544"/>
+              <a:ext cx="1018740" cy="646331"/>
+            </a:xfrm>
+            <a:prstGeom prst="rect">
+              <a:avLst/>
+            </a:prstGeom>
+            <a:noFill/>
+          </p:spPr>
+          <p:txBody>
+            <a:bodyPr wrap="none" rtlCol="0">
+              <a:spAutoFit/>
+            </a:bodyPr>
+            <a:lstStyle/>
+            <a:p>
+              <a:pPr algn="ctr"/>
+              <a:r>
+                <a:rPr lang="en-US" dirty="0"/>
+                <a:t>Home</a:t>
+              </a:r>
+              <a:br>
+                <a:rPr lang="en-US" dirty="0"/>
+              </a:br>
+              <a:r>
+                <a:rPr lang="en-US" dirty="0"/>
+                <a:t>Assistant</a:t>
+              </a:r>
+            </a:p>
+          </p:txBody>
+        </p:sp>
+        <p:pic>
+          <p:nvPicPr>
+            <p:cNvPr id="17" name="Picture 16">
+              <a:extLst>
+                <a:ext uri="{FF2B5EF4-FFF2-40B4-BE49-F238E27FC236}">
+                  <a16:creationId xmlns:a16="http://schemas.microsoft.com/office/drawing/2014/main" id="{C88F0C50-D978-2516-3012-3846082C667C}"/>
+                </a:ext>
+              </a:extLst>
+            </p:cNvPr>
+            <p:cNvPicPr>
+              <a:picLocks noChangeAspect="1"/>
+            </p:cNvPicPr>
+            <p:nvPr/>
+          </p:nvPicPr>
+          <p:blipFill>
+            <a:blip r:embed="rId6"/>
+            <a:stretch>
+              <a:fillRect/>
+            </a:stretch>
+          </p:blipFill>
+          <p:spPr>
+            <a:xfrm>
+              <a:off x="1756326" y="823176"/>
+              <a:ext cx="1519576" cy="1370305"/>
+            </a:xfrm>
+            <a:prstGeom prst="rect">
+              <a:avLst/>
+            </a:prstGeom>
+            <a:effectLst>
+              <a:outerShdw blurRad="177800" dist="38100" dir="5400000" sx="101000" sy="101000" algn="t" rotWithShape="0">
+                <a:prstClr val="black">
+                  <a:alpha val="40000"/>
+                </a:prstClr>
+              </a:outerShdw>
+            </a:effectLst>
+          </p:spPr>
+        </p:pic>
+        <p:pic>
+          <p:nvPicPr>
+            <p:cNvPr id="19" name="Picture 18">
+              <a:extLst>
+                <a:ext uri="{FF2B5EF4-FFF2-40B4-BE49-F238E27FC236}">
+                  <a16:creationId xmlns:a16="http://schemas.microsoft.com/office/drawing/2014/main" id="{D3C260F8-04C1-59AB-D2B8-96838699FC96}"/>
+                </a:ext>
+              </a:extLst>
+            </p:cNvPr>
+            <p:cNvPicPr>
+              <a:picLocks noChangeAspect="1"/>
+            </p:cNvPicPr>
+            <p:nvPr/>
+          </p:nvPicPr>
+          <p:blipFill>
+            <a:blip r:embed="rId7">
+              <a:extLst>
+                <a:ext uri="{28A0092B-C50C-407E-A947-70E740481C1C}">
+                  <a14:useLocalDpi xmlns:a14="http://schemas.microsoft.com/office/drawing/2010/main" val="0"/>
+                </a:ext>
+              </a:extLst>
+            </a:blip>
+            <a:stretch>
+              <a:fillRect/>
+            </a:stretch>
+          </p:blipFill>
+          <p:spPr>
+            <a:xfrm>
+              <a:off x="3799005" y="550535"/>
+              <a:ext cx="785904" cy="639366"/>
+            </a:xfrm>
+            <a:prstGeom prst="rect">
+              <a:avLst/>
+            </a:prstGeom>
+          </p:spPr>
+        </p:pic>
+        <p:pic>
+          <p:nvPicPr>
+            <p:cNvPr id="21" name="Picture 20">
+              <a:extLst>
+                <a:ext uri="{FF2B5EF4-FFF2-40B4-BE49-F238E27FC236}">
+                  <a16:creationId xmlns:a16="http://schemas.microsoft.com/office/drawing/2014/main" id="{52FCB469-2458-1902-CCBD-C2642C59AC28}"/>
+                </a:ext>
+              </a:extLst>
+            </p:cNvPr>
+            <p:cNvPicPr>
+              <a:picLocks noChangeAspect="1"/>
+            </p:cNvPicPr>
+            <p:nvPr/>
+          </p:nvPicPr>
+          <p:blipFill>
+            <a:blip r:embed="rId8">
+              <a:extLst>
+                <a:ext uri="{28A0092B-C50C-407E-A947-70E740481C1C}">
+                  <a14:useLocalDpi xmlns:a14="http://schemas.microsoft.com/office/drawing/2010/main" val="0"/>
+                </a:ext>
+              </a:extLst>
+            </a:blip>
+            <a:stretch>
+              <a:fillRect/>
+            </a:stretch>
+          </p:blipFill>
+          <p:spPr>
+            <a:xfrm>
+              <a:off x="2005742" y="2706838"/>
+              <a:ext cx="564636" cy="564636"/>
+            </a:xfrm>
+            <a:prstGeom prst="rect">
+              <a:avLst/>
+            </a:prstGeom>
+          </p:spPr>
+        </p:pic>
+        <p:sp>
+          <p:nvSpPr>
+            <p:cNvPr id="22" name="TextBox 21">
+              <a:extLst>
+                <a:ext uri="{FF2B5EF4-FFF2-40B4-BE49-F238E27FC236}">
+                  <a16:creationId xmlns:a16="http://schemas.microsoft.com/office/drawing/2014/main" id="{934E6490-056A-5978-DF16-99B26E56A4BD}"/>
+                </a:ext>
+              </a:extLst>
+            </p:cNvPr>
+            <p:cNvSpPr txBox="1"/>
+            <p:nvPr/>
+          </p:nvSpPr>
+          <p:spPr>
+            <a:xfrm>
+              <a:off x="2923116" y="1756614"/>
+              <a:ext cx="1155445" cy="646331"/>
+            </a:xfrm>
+            <a:prstGeom prst="rect">
+              <a:avLst/>
+            </a:prstGeom>
+            <a:noFill/>
+          </p:spPr>
+          <p:txBody>
+            <a:bodyPr wrap="none" rtlCol="0">
+              <a:spAutoFit/>
+            </a:bodyPr>
+            <a:lstStyle/>
+            <a:p>
+              <a:pPr algn="ctr"/>
+              <a:r>
+                <a:rPr lang="en-US" dirty="0"/>
+                <a:t>ESP-Home</a:t>
+              </a:r>
+              <a:br>
+                <a:rPr lang="en-US" dirty="0"/>
+              </a:br>
+              <a:r>
+                <a:rPr lang="en-US" dirty="0"/>
+                <a:t>Device</a:t>
+              </a:r>
+            </a:p>
+          </p:txBody>
+        </p:sp>
+        <p:sp>
+          <p:nvSpPr>
+            <p:cNvPr id="23" name="TextBox 22">
+              <a:extLst>
+                <a:ext uri="{FF2B5EF4-FFF2-40B4-BE49-F238E27FC236}">
+                  <a16:creationId xmlns:a16="http://schemas.microsoft.com/office/drawing/2014/main" id="{F0DC70C8-0BD9-8E45-C236-1DEF45454B1E}"/>
+                </a:ext>
+              </a:extLst>
+            </p:cNvPr>
+            <p:cNvSpPr txBox="1"/>
+            <p:nvPr/>
+          </p:nvSpPr>
+          <p:spPr>
+            <a:xfrm>
+              <a:off x="4332697" y="4942751"/>
+              <a:ext cx="1253933" cy="923330"/>
+            </a:xfrm>
+            <a:prstGeom prst="rect">
+              <a:avLst/>
+            </a:prstGeom>
+            <a:noFill/>
+          </p:spPr>
+          <p:txBody>
+            <a:bodyPr wrap="none" rtlCol="0">
+              <a:spAutoFit/>
+            </a:bodyPr>
+            <a:lstStyle/>
+            <a:p>
+              <a:pPr algn="ctr"/>
+              <a:r>
+                <a:rPr lang="en-US" dirty="0"/>
+                <a:t>FOSSiBOT</a:t>
+              </a:r>
+              <a:br>
+                <a:rPr lang="en-US" dirty="0"/>
+              </a:br>
+              <a:r>
+                <a:rPr lang="en-US" dirty="0"/>
+                <a:t>SYDPOWER</a:t>
+              </a:r>
+              <a:br>
+                <a:rPr lang="en-US" dirty="0"/>
+              </a:br>
+              <a:r>
+                <a:rPr lang="en-US" dirty="0"/>
+                <a:t>AFERIY</a:t>
+              </a:r>
+            </a:p>
+          </p:txBody>
+        </p:sp>
+        <p:sp>
+          <p:nvSpPr>
+            <p:cNvPr id="24" name="TextBox 23">
+              <a:extLst>
+                <a:ext uri="{FF2B5EF4-FFF2-40B4-BE49-F238E27FC236}">
+                  <a16:creationId xmlns:a16="http://schemas.microsoft.com/office/drawing/2014/main" id="{98123406-0C99-74CA-A857-6B1A031B6057}"/>
+                </a:ext>
+              </a:extLst>
+            </p:cNvPr>
+            <p:cNvSpPr txBox="1"/>
+            <p:nvPr/>
+          </p:nvSpPr>
+          <p:spPr>
+            <a:xfrm>
+              <a:off x="4689956" y="3363385"/>
+              <a:ext cx="1464055" cy="923330"/>
+            </a:xfrm>
+            <a:prstGeom prst="rect">
+              <a:avLst/>
+            </a:prstGeom>
+            <a:noFill/>
+          </p:spPr>
+          <p:txBody>
+            <a:bodyPr wrap="none" rtlCol="0">
+              <a:spAutoFit/>
+            </a:bodyPr>
+            <a:lstStyle/>
+            <a:p>
+              <a:pPr algn="ctr"/>
+              <a:r>
+                <a:rPr lang="en-US" b="1" dirty="0"/>
+                <a:t>Fully local</a:t>
+              </a:r>
+              <a:br>
+                <a:rPr lang="en-US" b="1" dirty="0"/>
+              </a:br>
+              <a:r>
+                <a:rPr lang="en-US" b="1" dirty="0"/>
+                <a:t>Battery</a:t>
+              </a:r>
+              <a:br>
+                <a:rPr lang="en-US" b="1" dirty="0"/>
+              </a:br>
+              <a:r>
+                <a:rPr lang="en-US" b="1" dirty="0"/>
+                <a:t>Management</a:t>
+              </a:r>
+            </a:p>
+          </p:txBody>
+        </p:sp>
+        <p:cxnSp>
+          <p:nvCxnSpPr>
+            <p:cNvPr id="28" name="Straight Connector 27">
+              <a:extLst>
+                <a:ext uri="{FF2B5EF4-FFF2-40B4-BE49-F238E27FC236}">
+                  <a16:creationId xmlns:a16="http://schemas.microsoft.com/office/drawing/2014/main" id="{B7E1474F-78AF-E55D-6FCF-EAE10EE55075}"/>
+                </a:ext>
+              </a:extLst>
+            </p:cNvPr>
+            <p:cNvCxnSpPr/>
+            <p:nvPr/>
+          </p:nvCxnSpPr>
+          <p:spPr>
+            <a:xfrm flipV="1">
+              <a:off x="5929460" y="3271474"/>
+              <a:ext cx="675910" cy="544025"/>
+            </a:xfrm>
+            <a:prstGeom prst="line">
+              <a:avLst/>
+            </a:prstGeom>
+          </p:spPr>
+          <p:style>
+            <a:lnRef idx="1">
+              <a:schemeClr val="accent1"/>
+            </a:lnRef>
+            <a:fillRef idx="0">
+              <a:schemeClr val="accent1"/>
+            </a:fillRef>
+            <a:effectRef idx="0">
+              <a:schemeClr val="accent1"/>
+            </a:effectRef>
+            <a:fontRef idx="minor">
+              <a:schemeClr val="tx1"/>
+            </a:fontRef>
+          </p:style>
+        </p:cxnSp>
+      </p:grpSp>
+    </p:spTree>
+    <p:extLst>
+      <p:ext uri="{BB962C8B-B14F-4D97-AF65-F5344CB8AC3E}">
+        <p14:creationId xmlns:p14="http://schemas.microsoft.com/office/powerpoint/2010/main" val="2571541771"/>
+      </p:ext>
+    </p:extLst>
+  </p:cSld>
+  <p:clrMapOvr>
+    <a:masterClrMapping/>
+  </p:clrMapOvr>
+</p:sld>
+</file>
+
+<file path=ppt/slides/slide3.xml><?xml version="1.0" encoding="utf-8"?>
 <p:sld xmlns:a="http://schemas.openxmlformats.org/drawingml/2006/main" xmlns:r="http://schemas.openxmlformats.org/officeDocument/2006/relationships" xmlns:p="http://schemas.openxmlformats.org/presentationml/2006/main">
   <p:cSld>
     <p:spTree>

</xml_diff>

<commit_message>
Added M5 StackC extras
</commit_message>
<xml_diff>
--- a/docs/slides.pptx
+++ b/docs/slides.pptx
@@ -8,6 +8,7 @@
     <p:sldId id="258" r:id="rId2"/>
     <p:sldId id="260" r:id="rId3"/>
     <p:sldId id="259" r:id="rId4"/>
+    <p:sldId id="261" r:id="rId5"/>
   </p:sldIdLst>
   <p:sldSz cx="12192000" cy="6858000"/>
   <p:notesSz cx="6858000" cy="9144000"/>
@@ -261,7 +262,7 @@
           <a:p>
             <a:fld id="{4F735CCE-55D4-41A9-BDB8-A4CE9CB703D2}" type="datetimeFigureOut">
               <a:rPr lang="en-US" smtClean="0"/>
-              <a:t>12/9/2025</a:t>
+              <a:t>12/28/2025</a:t>
             </a:fld>
             <a:endParaRPr lang="en-US"/>
           </a:p>
@@ -459,7 +460,7 @@
           <a:p>
             <a:fld id="{4F735CCE-55D4-41A9-BDB8-A4CE9CB703D2}" type="datetimeFigureOut">
               <a:rPr lang="en-US" smtClean="0"/>
-              <a:t>12/9/2025</a:t>
+              <a:t>12/28/2025</a:t>
             </a:fld>
             <a:endParaRPr lang="en-US"/>
           </a:p>
@@ -667,7 +668,7 @@
           <a:p>
             <a:fld id="{4F735CCE-55D4-41A9-BDB8-A4CE9CB703D2}" type="datetimeFigureOut">
               <a:rPr lang="en-US" smtClean="0"/>
-              <a:t>12/9/2025</a:t>
+              <a:t>12/28/2025</a:t>
             </a:fld>
             <a:endParaRPr lang="en-US"/>
           </a:p>
@@ -865,7 +866,7 @@
           <a:p>
             <a:fld id="{4F735CCE-55D4-41A9-BDB8-A4CE9CB703D2}" type="datetimeFigureOut">
               <a:rPr lang="en-US" smtClean="0"/>
-              <a:t>12/9/2025</a:t>
+              <a:t>12/28/2025</a:t>
             </a:fld>
             <a:endParaRPr lang="en-US"/>
           </a:p>
@@ -1140,7 +1141,7 @@
           <a:p>
             <a:fld id="{4F735CCE-55D4-41A9-BDB8-A4CE9CB703D2}" type="datetimeFigureOut">
               <a:rPr lang="en-US" smtClean="0"/>
-              <a:t>12/9/2025</a:t>
+              <a:t>12/28/2025</a:t>
             </a:fld>
             <a:endParaRPr lang="en-US"/>
           </a:p>
@@ -1405,7 +1406,7 @@
           <a:p>
             <a:fld id="{4F735CCE-55D4-41A9-BDB8-A4CE9CB703D2}" type="datetimeFigureOut">
               <a:rPr lang="en-US" smtClean="0"/>
-              <a:t>12/9/2025</a:t>
+              <a:t>12/28/2025</a:t>
             </a:fld>
             <a:endParaRPr lang="en-US"/>
           </a:p>
@@ -1817,7 +1818,7 @@
           <a:p>
             <a:fld id="{4F735CCE-55D4-41A9-BDB8-A4CE9CB703D2}" type="datetimeFigureOut">
               <a:rPr lang="en-US" smtClean="0"/>
-              <a:t>12/9/2025</a:t>
+              <a:t>12/28/2025</a:t>
             </a:fld>
             <a:endParaRPr lang="en-US"/>
           </a:p>
@@ -1958,7 +1959,7 @@
           <a:p>
             <a:fld id="{4F735CCE-55D4-41A9-BDB8-A4CE9CB703D2}" type="datetimeFigureOut">
               <a:rPr lang="en-US" smtClean="0"/>
-              <a:t>12/9/2025</a:t>
+              <a:t>12/28/2025</a:t>
             </a:fld>
             <a:endParaRPr lang="en-US"/>
           </a:p>
@@ -2071,7 +2072,7 @@
           <a:p>
             <a:fld id="{4F735CCE-55D4-41A9-BDB8-A4CE9CB703D2}" type="datetimeFigureOut">
               <a:rPr lang="en-US" smtClean="0"/>
-              <a:t>12/9/2025</a:t>
+              <a:t>12/28/2025</a:t>
             </a:fld>
             <a:endParaRPr lang="en-US"/>
           </a:p>
@@ -2382,7 +2383,7 @@
           <a:p>
             <a:fld id="{4F735CCE-55D4-41A9-BDB8-A4CE9CB703D2}" type="datetimeFigureOut">
               <a:rPr lang="en-US" smtClean="0"/>
-              <a:t>12/9/2025</a:t>
+              <a:t>12/28/2025</a:t>
             </a:fld>
             <a:endParaRPr lang="en-US"/>
           </a:p>
@@ -2670,7 +2671,7 @@
           <a:p>
             <a:fld id="{4F735CCE-55D4-41A9-BDB8-A4CE9CB703D2}" type="datetimeFigureOut">
               <a:rPr lang="en-US" smtClean="0"/>
-              <a:t>12/9/2025</a:t>
+              <a:t>12/28/2025</a:t>
             </a:fld>
             <a:endParaRPr lang="en-US"/>
           </a:p>
@@ -2911,7 +2912,7 @@
           <a:p>
             <a:fld id="{4F735CCE-55D4-41A9-BDB8-A4CE9CB703D2}" type="datetimeFigureOut">
               <a:rPr lang="en-US" smtClean="0"/>
-              <a:t>12/9/2025</a:t>
+              <a:t>12/28/2025</a:t>
             </a:fld>
             <a:endParaRPr lang="en-US"/>
           </a:p>
@@ -4037,12 +4038,220 @@
           <a:chExt cx="0" cy="0"/>
         </a:xfrm>
       </p:grpSpPr>
+      <p:sp>
+        <p:nvSpPr>
+          <p:cNvPr id="12" name="Freeform: Shape 11">
+            <a:extLst>
+              <a:ext uri="{FF2B5EF4-FFF2-40B4-BE49-F238E27FC236}">
+                <a16:creationId xmlns:a16="http://schemas.microsoft.com/office/drawing/2014/main" id="{65FF1D18-C189-BA88-787D-56587E273232}"/>
+              </a:ext>
+            </a:extLst>
+          </p:cNvPr>
+          <p:cNvSpPr/>
+          <p:nvPr/>
+        </p:nvSpPr>
+        <p:spPr>
+          <a:xfrm>
+            <a:off x="2397360" y="1181100"/>
+            <a:ext cx="2803290" cy="2973885"/>
+          </a:xfrm>
+          <a:custGeom>
+            <a:avLst/>
+            <a:gdLst>
+              <a:gd name="connsiteX0" fmla="*/ 679215 w 2803290"/>
+              <a:gd name="connsiteY0" fmla="*/ 2276475 h 2276475"/>
+              <a:gd name="connsiteX1" fmla="*/ 126765 w 2803290"/>
+              <a:gd name="connsiteY1" fmla="*/ 447675 h 2276475"/>
+              <a:gd name="connsiteX2" fmla="*/ 2803290 w 2803290"/>
+              <a:gd name="connsiteY2" fmla="*/ 0 h 2276475"/>
+            </a:gdLst>
+            <a:ahLst/>
+            <a:cxnLst>
+              <a:cxn ang="0">
+                <a:pos x="connsiteX0" y="connsiteY0"/>
+              </a:cxn>
+              <a:cxn ang="0">
+                <a:pos x="connsiteX1" y="connsiteY1"/>
+              </a:cxn>
+              <a:cxn ang="0">
+                <a:pos x="connsiteX2" y="connsiteY2"/>
+              </a:cxn>
+            </a:cxnLst>
+            <a:rect l="l" t="t" r="r" b="b"/>
+            <a:pathLst>
+              <a:path w="2803290" h="2276475">
+                <a:moveTo>
+                  <a:pt x="679215" y="2276475"/>
+                </a:moveTo>
+                <a:cubicBezTo>
+                  <a:pt x="225983" y="1551781"/>
+                  <a:pt x="-227248" y="827088"/>
+                  <a:pt x="126765" y="447675"/>
+                </a:cubicBezTo>
+                <a:cubicBezTo>
+                  <a:pt x="480778" y="68262"/>
+                  <a:pt x="1642034" y="34131"/>
+                  <a:pt x="2803290" y="0"/>
+                </a:cubicBezTo>
+              </a:path>
+            </a:pathLst>
+          </a:custGeom>
+          <a:noFill/>
+          <a:ln w="38100">
+            <a:solidFill>
+              <a:schemeClr val="accent3"/>
+            </a:solidFill>
+            <a:prstDash val="sysDash"/>
+            <a:tailEnd type="triangle"/>
+          </a:ln>
+        </p:spPr>
+        <p:style>
+          <a:lnRef idx="2">
+            <a:schemeClr val="accent1">
+              <a:shade val="15000"/>
+            </a:schemeClr>
+          </a:lnRef>
+          <a:fillRef idx="1">
+            <a:schemeClr val="accent1"/>
+          </a:fillRef>
+          <a:effectRef idx="0">
+            <a:schemeClr val="accent1"/>
+          </a:effectRef>
+          <a:fontRef idx="minor">
+            <a:schemeClr val="lt1"/>
+          </a:fontRef>
+        </p:style>
+        <p:txBody>
+          <a:bodyPr rtlCol="0" anchor="ctr"/>
+          <a:lstStyle/>
+          <a:p>
+            <a:pPr algn="ctr"/>
+            <a:endParaRPr lang="en-US"/>
+          </a:p>
+        </p:txBody>
+      </p:sp>
+      <p:pic>
+        <p:nvPicPr>
+          <p:cNvPr id="5" name="Picture 4">
+            <a:extLst>
+              <a:ext uri="{FF2B5EF4-FFF2-40B4-BE49-F238E27FC236}">
+                <a16:creationId xmlns:a16="http://schemas.microsoft.com/office/drawing/2014/main" id="{F309AB5A-4E8E-96C7-75F4-8D98F57D3E75}"/>
+              </a:ext>
+            </a:extLst>
+          </p:cNvPr>
+          <p:cNvPicPr>
+            <a:picLocks noChangeAspect="1"/>
+          </p:cNvPicPr>
+          <p:nvPr/>
+        </p:nvPicPr>
+        <p:blipFill>
+          <a:blip r:embed="rId2">
+            <a:extLst>
+              <a:ext uri="{28A0092B-C50C-407E-A947-70E740481C1C}">
+                <a14:useLocalDpi xmlns:a14="http://schemas.microsoft.com/office/drawing/2010/main" val="0"/>
+              </a:ext>
+            </a:extLst>
+          </a:blip>
+          <a:stretch>
+            <a:fillRect/>
+          </a:stretch>
+        </p:blipFill>
+        <p:spPr>
+          <a:xfrm>
+            <a:off x="6668033" y="1209233"/>
+            <a:ext cx="3116850" cy="5212532"/>
+          </a:xfrm>
+          <a:prstGeom prst="rect">
+            <a:avLst/>
+          </a:prstGeom>
+          <a:effectLst>
+            <a:outerShdw blurRad="177800" dist="38100" dir="5400000" sx="103000" sy="103000" algn="t" rotWithShape="0">
+              <a:prstClr val="black">
+                <a:alpha val="40000"/>
+              </a:prstClr>
+            </a:outerShdw>
+          </a:effectLst>
+        </p:spPr>
+      </p:pic>
+      <p:pic>
+        <p:nvPicPr>
+          <p:cNvPr id="3" name="Picture 2">
+            <a:extLst>
+              <a:ext uri="{FF2B5EF4-FFF2-40B4-BE49-F238E27FC236}">
+                <a16:creationId xmlns:a16="http://schemas.microsoft.com/office/drawing/2014/main" id="{BA070D71-4C26-C1B0-5DE4-ADE9562A1C59}"/>
+              </a:ext>
+            </a:extLst>
+          </p:cNvPr>
+          <p:cNvPicPr>
+            <a:picLocks noChangeAspect="1"/>
+          </p:cNvPicPr>
+          <p:nvPr/>
+        </p:nvPicPr>
+        <p:blipFill>
+          <a:blip r:embed="rId3">
+            <a:extLst>
+              <a:ext uri="{28A0092B-C50C-407E-A947-70E740481C1C}">
+                <a14:useLocalDpi xmlns:a14="http://schemas.microsoft.com/office/drawing/2010/main" val="0"/>
+              </a:ext>
+            </a:extLst>
+          </a:blip>
+          <a:stretch>
+            <a:fillRect/>
+          </a:stretch>
+        </p:blipFill>
+        <p:spPr>
+          <a:xfrm>
+            <a:off x="7981970" y="436235"/>
+            <a:ext cx="3147333" cy="2552921"/>
+          </a:xfrm>
+          <a:prstGeom prst="rect">
+            <a:avLst/>
+          </a:prstGeom>
+          <a:effectLst>
+            <a:outerShdw blurRad="177800" dist="38100" dir="5400000" sx="103000" sy="103000" algn="t" rotWithShape="0">
+              <a:prstClr val="black">
+                <a:alpha val="40000"/>
+              </a:prstClr>
+            </a:outerShdw>
+          </a:effectLst>
+        </p:spPr>
+      </p:pic>
+      <p:pic>
+        <p:nvPicPr>
+          <p:cNvPr id="7" name="Picture 6">
+            <a:extLst>
+              <a:ext uri="{FF2B5EF4-FFF2-40B4-BE49-F238E27FC236}">
+                <a16:creationId xmlns:a16="http://schemas.microsoft.com/office/drawing/2014/main" id="{AD9C46F3-90A8-ACF3-F15B-D493EFCE5AF8}"/>
+              </a:ext>
+            </a:extLst>
+          </p:cNvPr>
+          <p:cNvPicPr>
+            <a:picLocks noChangeAspect="1"/>
+          </p:cNvPicPr>
+          <p:nvPr/>
+        </p:nvPicPr>
+        <p:blipFill>
+          <a:blip r:embed="rId4"/>
+          <a:stretch>
+            <a:fillRect/>
+          </a:stretch>
+        </p:blipFill>
+        <p:spPr>
+          <a:xfrm>
+            <a:off x="1855823" y="3784831"/>
+            <a:ext cx="2542945" cy="2918970"/>
+          </a:xfrm>
+          <a:prstGeom prst="rect">
+            <a:avLst/>
+          </a:prstGeom>
+        </p:spPr>
+      </p:pic>
       <p:grpSp>
         <p:nvGrpSpPr>
-          <p:cNvPr id="29" name="Group 28">
-            <a:extLst>
-              <a:ext uri="{FF2B5EF4-FFF2-40B4-BE49-F238E27FC236}">
-                <a16:creationId xmlns:a16="http://schemas.microsoft.com/office/drawing/2014/main" id="{0E945597-7703-DCA5-63B2-89FF39D37E6C}"/>
+          <p:cNvPr id="11" name="Group 10">
+            <a:extLst>
+              <a:ext uri="{FF2B5EF4-FFF2-40B4-BE49-F238E27FC236}">
+                <a16:creationId xmlns:a16="http://schemas.microsoft.com/office/drawing/2014/main" id="{F6063694-F7F5-E219-043F-527886087A7C}"/>
               </a:ext>
             </a:extLst>
           </p:cNvPr>
@@ -4051,18 +4260,18 @@
         </p:nvGrpSpPr>
         <p:grpSpPr>
           <a:xfrm>
-            <a:off x="1756326" y="436235"/>
-            <a:ext cx="9372977" cy="6267566"/>
-            <a:chOff x="1756326" y="436235"/>
-            <a:chExt cx="9372977" cy="6267566"/>
+            <a:off x="5309950" y="436235"/>
+            <a:ext cx="1572100" cy="1572100"/>
+            <a:chOff x="2329508" y="1349121"/>
+            <a:chExt cx="1572100" cy="1572100"/>
           </a:xfrm>
         </p:grpSpPr>
         <p:sp>
           <p:nvSpPr>
-            <p:cNvPr id="12" name="Freeform: Shape 11">
+            <p:cNvPr id="10" name="Rectangle: Rounded Corners 9">
               <a:extLst>
                 <a:ext uri="{FF2B5EF4-FFF2-40B4-BE49-F238E27FC236}">
-                  <a16:creationId xmlns:a16="http://schemas.microsoft.com/office/drawing/2014/main" id="{65FF1D18-C189-BA88-787D-56587E273232}"/>
+                  <a16:creationId xmlns:a16="http://schemas.microsoft.com/office/drawing/2014/main" id="{CEC39AAE-8F2D-BD8A-C490-9CC0C05ECCB5}"/>
                 </a:ext>
               </a:extLst>
             </p:cNvPr>
@@ -4071,58 +4280,22 @@
           </p:nvSpPr>
           <p:spPr>
             <a:xfrm>
-              <a:off x="2397360" y="1181100"/>
-              <a:ext cx="2803290" cy="2973885"/>
+              <a:off x="2441542" y="1461155"/>
+              <a:ext cx="1348033" cy="1348033"/>
             </a:xfrm>
-            <a:custGeom>
+            <a:prstGeom prst="roundRect">
               <a:avLst/>
-              <a:gdLst>
-                <a:gd name="connsiteX0" fmla="*/ 679215 w 2803290"/>
-                <a:gd name="connsiteY0" fmla="*/ 2276475 h 2276475"/>
-                <a:gd name="connsiteX1" fmla="*/ 126765 w 2803290"/>
-                <a:gd name="connsiteY1" fmla="*/ 447675 h 2276475"/>
-                <a:gd name="connsiteX2" fmla="*/ 2803290 w 2803290"/>
-                <a:gd name="connsiteY2" fmla="*/ 0 h 2276475"/>
-              </a:gdLst>
-              <a:ahLst/>
-              <a:cxnLst>
-                <a:cxn ang="0">
-                  <a:pos x="connsiteX0" y="connsiteY0"/>
-                </a:cxn>
-                <a:cxn ang="0">
-                  <a:pos x="connsiteX1" y="connsiteY1"/>
-                </a:cxn>
-                <a:cxn ang="0">
-                  <a:pos x="connsiteX2" y="connsiteY2"/>
-                </a:cxn>
-              </a:cxnLst>
-              <a:rect l="l" t="t" r="r" b="b"/>
-              <a:pathLst>
-                <a:path w="2803290" h="2276475">
-                  <a:moveTo>
-                    <a:pt x="679215" y="2276475"/>
-                  </a:moveTo>
-                  <a:cubicBezTo>
-                    <a:pt x="225983" y="1551781"/>
-                    <a:pt x="-227248" y="827088"/>
-                    <a:pt x="126765" y="447675"/>
-                  </a:cubicBezTo>
-                  <a:cubicBezTo>
-                    <a:pt x="480778" y="68262"/>
-                    <a:pt x="1642034" y="34131"/>
-                    <a:pt x="2803290" y="0"/>
-                  </a:cubicBezTo>
-                </a:path>
-              </a:pathLst>
-            </a:custGeom>
-            <a:noFill/>
-            <a:ln w="38100">
-              <a:solidFill>
-                <a:schemeClr val="accent3"/>
-              </a:solidFill>
-              <a:prstDash val="sysDash"/>
-              <a:tailEnd type="triangle"/>
-            </a:ln>
+            </a:prstGeom>
+            <a:solidFill>
+              <a:schemeClr val="bg1"/>
+            </a:solidFill>
+            <a:effectLst>
+              <a:outerShdw blurRad="177800" dist="38100" dir="5400000" sx="103000" sy="103000" algn="t" rotWithShape="0">
+                <a:prstClr val="black">
+                  <a:alpha val="40000"/>
+                </a:prstClr>
+              </a:outerShdw>
+            </a:effectLst>
           </p:spPr>
           <p:style>
             <a:lnRef idx="2">
@@ -4151,10 +4324,10 @@
         </p:sp>
         <p:pic>
           <p:nvPicPr>
-            <p:cNvPr id="5" name="Picture 4">
+            <p:cNvPr id="9" name="Picture 8">
               <a:extLst>
                 <a:ext uri="{FF2B5EF4-FFF2-40B4-BE49-F238E27FC236}">
-                  <a16:creationId xmlns:a16="http://schemas.microsoft.com/office/drawing/2014/main" id="{F309AB5A-4E8E-96C7-75F4-8D98F57D3E75}"/>
+                  <a16:creationId xmlns:a16="http://schemas.microsoft.com/office/drawing/2014/main" id="{1225B6E4-A256-C10F-5FD1-3DFB51A96124}"/>
                 </a:ext>
               </a:extLst>
             </p:cNvPr>
@@ -4164,7 +4337,7 @@
             <p:nvPr/>
           </p:nvPicPr>
           <p:blipFill>
-            <a:blip r:embed="rId2">
+            <a:blip r:embed="rId5">
               <a:extLst>
                 <a:ext uri="{28A0092B-C50C-407E-A947-70E740481C1C}">
                   <a14:useLocalDpi xmlns:a14="http://schemas.microsoft.com/office/drawing/2010/main" val="0"/>
@@ -4177,539 +4350,346 @@
           </p:blipFill>
           <p:spPr>
             <a:xfrm>
-              <a:off x="6668033" y="1209233"/>
-              <a:ext cx="3116850" cy="5212532"/>
-            </a:xfrm>
-            <a:prstGeom prst="rect">
-              <a:avLst/>
-            </a:prstGeom>
-            <a:effectLst>
-              <a:outerShdw blurRad="177800" dist="38100" dir="5400000" sx="103000" sy="103000" algn="t" rotWithShape="0">
-                <a:prstClr val="black">
-                  <a:alpha val="40000"/>
-                </a:prstClr>
-              </a:outerShdw>
-            </a:effectLst>
-          </p:spPr>
-        </p:pic>
-        <p:pic>
-          <p:nvPicPr>
-            <p:cNvPr id="3" name="Picture 2">
-              <a:extLst>
-                <a:ext uri="{FF2B5EF4-FFF2-40B4-BE49-F238E27FC236}">
-                  <a16:creationId xmlns:a16="http://schemas.microsoft.com/office/drawing/2014/main" id="{BA070D71-4C26-C1B0-5DE4-ADE9562A1C59}"/>
-                </a:ext>
-              </a:extLst>
-            </p:cNvPr>
-            <p:cNvPicPr>
-              <a:picLocks noChangeAspect="1"/>
-            </p:cNvPicPr>
-            <p:nvPr/>
-          </p:nvPicPr>
-          <p:blipFill>
-            <a:blip r:embed="rId3">
-              <a:extLst>
-                <a:ext uri="{28A0092B-C50C-407E-A947-70E740481C1C}">
-                  <a14:useLocalDpi xmlns:a14="http://schemas.microsoft.com/office/drawing/2010/main" val="0"/>
-                </a:ext>
-              </a:extLst>
-            </a:blip>
-            <a:stretch>
-              <a:fillRect/>
-            </a:stretch>
-          </p:blipFill>
-          <p:spPr>
-            <a:xfrm>
-              <a:off x="7981970" y="436235"/>
-              <a:ext cx="3147333" cy="2552921"/>
-            </a:xfrm>
-            <a:prstGeom prst="rect">
-              <a:avLst/>
-            </a:prstGeom>
-            <a:effectLst>
-              <a:outerShdw blurRad="177800" dist="38100" dir="5400000" sx="103000" sy="103000" algn="t" rotWithShape="0">
-                <a:prstClr val="black">
-                  <a:alpha val="40000"/>
-                </a:prstClr>
-              </a:outerShdw>
-            </a:effectLst>
-          </p:spPr>
-        </p:pic>
-        <p:pic>
-          <p:nvPicPr>
-            <p:cNvPr id="7" name="Picture 6">
-              <a:extLst>
-                <a:ext uri="{FF2B5EF4-FFF2-40B4-BE49-F238E27FC236}">
-                  <a16:creationId xmlns:a16="http://schemas.microsoft.com/office/drawing/2014/main" id="{AD9C46F3-90A8-ACF3-F15B-D493EFCE5AF8}"/>
-                </a:ext>
-              </a:extLst>
-            </p:cNvPr>
-            <p:cNvPicPr>
-              <a:picLocks noChangeAspect="1"/>
-            </p:cNvPicPr>
-            <p:nvPr/>
-          </p:nvPicPr>
-          <p:blipFill>
-            <a:blip r:embed="rId4"/>
-            <a:stretch>
-              <a:fillRect/>
-            </a:stretch>
-          </p:blipFill>
-          <p:spPr>
-            <a:xfrm>
-              <a:off x="1855823" y="3784831"/>
-              <a:ext cx="2542945" cy="2918970"/>
+              <a:off x="2329508" y="1349121"/>
+              <a:ext cx="1572100" cy="1572100"/>
             </a:xfrm>
             <a:prstGeom prst="rect">
               <a:avLst/>
             </a:prstGeom>
           </p:spPr>
         </p:pic>
-        <p:grpSp>
-          <p:nvGrpSpPr>
-            <p:cNvPr id="11" name="Group 10">
-              <a:extLst>
-                <a:ext uri="{FF2B5EF4-FFF2-40B4-BE49-F238E27FC236}">
-                  <a16:creationId xmlns:a16="http://schemas.microsoft.com/office/drawing/2014/main" id="{F6063694-F7F5-E219-043F-527886087A7C}"/>
-                </a:ext>
-              </a:extLst>
-            </p:cNvPr>
-            <p:cNvGrpSpPr/>
-            <p:nvPr/>
-          </p:nvGrpSpPr>
-          <p:grpSpPr>
-            <a:xfrm>
-              <a:off x="5309950" y="436235"/>
-              <a:ext cx="1572100" cy="1572100"/>
-              <a:chOff x="2329508" y="1349121"/>
-              <a:chExt cx="1572100" cy="1572100"/>
-            </a:xfrm>
-          </p:grpSpPr>
-          <p:sp>
-            <p:nvSpPr>
-              <p:cNvPr id="10" name="Rectangle: Rounded Corners 9">
-                <a:extLst>
-                  <a:ext uri="{FF2B5EF4-FFF2-40B4-BE49-F238E27FC236}">
-                    <a16:creationId xmlns:a16="http://schemas.microsoft.com/office/drawing/2014/main" id="{CEC39AAE-8F2D-BD8A-C490-9CC0C05ECCB5}"/>
-                  </a:ext>
-                </a:extLst>
-              </p:cNvPr>
-              <p:cNvSpPr/>
-              <p:nvPr/>
-            </p:nvSpPr>
-            <p:spPr>
-              <a:xfrm>
-                <a:off x="2441542" y="1461155"/>
-                <a:ext cx="1348033" cy="1348033"/>
-              </a:xfrm>
-              <a:prstGeom prst="roundRect">
-                <a:avLst/>
-              </a:prstGeom>
-              <a:solidFill>
-                <a:schemeClr val="bg1"/>
-              </a:solidFill>
-              <a:effectLst>
-                <a:outerShdw blurRad="177800" dist="38100" dir="5400000" sx="103000" sy="103000" algn="t" rotWithShape="0">
-                  <a:prstClr val="black">
-                    <a:alpha val="40000"/>
-                  </a:prstClr>
-                </a:outerShdw>
-              </a:effectLst>
-            </p:spPr>
-            <p:style>
-              <a:lnRef idx="2">
-                <a:schemeClr val="accent1">
-                  <a:shade val="15000"/>
-                </a:schemeClr>
-              </a:lnRef>
-              <a:fillRef idx="1">
-                <a:schemeClr val="accent1"/>
-              </a:fillRef>
-              <a:effectRef idx="0">
-                <a:schemeClr val="accent1"/>
-              </a:effectRef>
-              <a:fontRef idx="minor">
-                <a:schemeClr val="lt1"/>
-              </a:fontRef>
-            </p:style>
-            <p:txBody>
-              <a:bodyPr rtlCol="0" anchor="ctr"/>
-              <a:lstStyle/>
-              <a:p>
-                <a:pPr algn="ctr"/>
-                <a:endParaRPr lang="en-US"/>
-              </a:p>
-            </p:txBody>
-          </p:sp>
-          <p:pic>
-            <p:nvPicPr>
-              <p:cNvPr id="9" name="Picture 8">
-                <a:extLst>
-                  <a:ext uri="{FF2B5EF4-FFF2-40B4-BE49-F238E27FC236}">
-                    <a16:creationId xmlns:a16="http://schemas.microsoft.com/office/drawing/2014/main" id="{1225B6E4-A256-C10F-5FD1-3DFB51A96124}"/>
-                  </a:ext>
-                </a:extLst>
-              </p:cNvPr>
-              <p:cNvPicPr>
-                <a:picLocks noChangeAspect="1"/>
-              </p:cNvPicPr>
-              <p:nvPr/>
-            </p:nvPicPr>
-            <p:blipFill>
-              <a:blip r:embed="rId5">
-                <a:extLst>
-                  <a:ext uri="{28A0092B-C50C-407E-A947-70E740481C1C}">
-                    <a14:useLocalDpi xmlns:a14="http://schemas.microsoft.com/office/drawing/2010/main" val="0"/>
-                  </a:ext>
-                </a:extLst>
-              </a:blip>
-              <a:stretch>
-                <a:fillRect/>
-              </a:stretch>
-            </p:blipFill>
-            <p:spPr>
-              <a:xfrm>
-                <a:off x="2329508" y="1349121"/>
-                <a:ext cx="1572100" cy="1572100"/>
-              </a:xfrm>
-              <a:prstGeom prst="rect">
-                <a:avLst/>
-              </a:prstGeom>
-            </p:spPr>
-          </p:pic>
-        </p:grpSp>
-        <p:sp>
-          <p:nvSpPr>
-            <p:cNvPr id="13" name="TextBox 12">
-              <a:extLst>
-                <a:ext uri="{FF2B5EF4-FFF2-40B4-BE49-F238E27FC236}">
-                  <a16:creationId xmlns:a16="http://schemas.microsoft.com/office/drawing/2014/main" id="{6AA23F15-FEF3-A611-ABBA-507F4FEAE605}"/>
-                </a:ext>
-              </a:extLst>
-            </p:cNvPr>
-            <p:cNvSpPr txBox="1"/>
-            <p:nvPr/>
-          </p:nvSpPr>
-          <p:spPr>
-            <a:xfrm>
-              <a:off x="5586630" y="1996544"/>
-              <a:ext cx="1018740" cy="646331"/>
-            </a:xfrm>
-            <a:prstGeom prst="rect">
-              <a:avLst/>
-            </a:prstGeom>
-            <a:noFill/>
-          </p:spPr>
-          <p:txBody>
-            <a:bodyPr wrap="none" rtlCol="0">
-              <a:spAutoFit/>
-            </a:bodyPr>
-            <a:lstStyle/>
-            <a:p>
-              <a:pPr algn="ctr"/>
-              <a:r>
-                <a:rPr lang="en-US" dirty="0"/>
-                <a:t>Home</a:t>
-              </a:r>
-              <a:br>
-                <a:rPr lang="en-US" dirty="0"/>
-              </a:br>
-              <a:r>
-                <a:rPr lang="en-US" dirty="0"/>
-                <a:t>Assistant</a:t>
-              </a:r>
-            </a:p>
-          </p:txBody>
-        </p:sp>
-        <p:pic>
-          <p:nvPicPr>
-            <p:cNvPr id="17" name="Picture 16">
-              <a:extLst>
-                <a:ext uri="{FF2B5EF4-FFF2-40B4-BE49-F238E27FC236}">
-                  <a16:creationId xmlns:a16="http://schemas.microsoft.com/office/drawing/2014/main" id="{C88F0C50-D978-2516-3012-3846082C667C}"/>
-                </a:ext>
-              </a:extLst>
-            </p:cNvPr>
-            <p:cNvPicPr>
-              <a:picLocks noChangeAspect="1"/>
-            </p:cNvPicPr>
-            <p:nvPr/>
-          </p:nvPicPr>
-          <p:blipFill>
-            <a:blip r:embed="rId6"/>
-            <a:stretch>
-              <a:fillRect/>
-            </a:stretch>
-          </p:blipFill>
-          <p:spPr>
-            <a:xfrm>
-              <a:off x="1756326" y="823176"/>
-              <a:ext cx="1519576" cy="1370305"/>
-            </a:xfrm>
-            <a:prstGeom prst="rect">
-              <a:avLst/>
-            </a:prstGeom>
-            <a:effectLst>
-              <a:outerShdw blurRad="177800" dist="38100" dir="5400000" sx="101000" sy="101000" algn="t" rotWithShape="0">
-                <a:prstClr val="black">
-                  <a:alpha val="40000"/>
-                </a:prstClr>
-              </a:outerShdw>
-            </a:effectLst>
-          </p:spPr>
-        </p:pic>
-        <p:pic>
-          <p:nvPicPr>
-            <p:cNvPr id="19" name="Picture 18">
-              <a:extLst>
-                <a:ext uri="{FF2B5EF4-FFF2-40B4-BE49-F238E27FC236}">
-                  <a16:creationId xmlns:a16="http://schemas.microsoft.com/office/drawing/2014/main" id="{D3C260F8-04C1-59AB-D2B8-96838699FC96}"/>
-                </a:ext>
-              </a:extLst>
-            </p:cNvPr>
-            <p:cNvPicPr>
-              <a:picLocks noChangeAspect="1"/>
-            </p:cNvPicPr>
-            <p:nvPr/>
-          </p:nvPicPr>
-          <p:blipFill>
-            <a:blip r:embed="rId7">
-              <a:extLst>
-                <a:ext uri="{28A0092B-C50C-407E-A947-70E740481C1C}">
-                  <a14:useLocalDpi xmlns:a14="http://schemas.microsoft.com/office/drawing/2010/main" val="0"/>
-                </a:ext>
-              </a:extLst>
-            </a:blip>
-            <a:stretch>
-              <a:fillRect/>
-            </a:stretch>
-          </p:blipFill>
-          <p:spPr>
-            <a:xfrm>
-              <a:off x="3799005" y="550535"/>
-              <a:ext cx="785904" cy="639366"/>
-            </a:xfrm>
-            <a:prstGeom prst="rect">
-              <a:avLst/>
-            </a:prstGeom>
-          </p:spPr>
-        </p:pic>
-        <p:pic>
-          <p:nvPicPr>
-            <p:cNvPr id="21" name="Picture 20">
-              <a:extLst>
-                <a:ext uri="{FF2B5EF4-FFF2-40B4-BE49-F238E27FC236}">
-                  <a16:creationId xmlns:a16="http://schemas.microsoft.com/office/drawing/2014/main" id="{52FCB469-2458-1902-CCBD-C2642C59AC28}"/>
-                </a:ext>
-              </a:extLst>
-            </p:cNvPr>
-            <p:cNvPicPr>
-              <a:picLocks noChangeAspect="1"/>
-            </p:cNvPicPr>
-            <p:nvPr/>
-          </p:nvPicPr>
-          <p:blipFill>
-            <a:blip r:embed="rId8">
-              <a:extLst>
-                <a:ext uri="{28A0092B-C50C-407E-A947-70E740481C1C}">
-                  <a14:useLocalDpi xmlns:a14="http://schemas.microsoft.com/office/drawing/2010/main" val="0"/>
-                </a:ext>
-              </a:extLst>
-            </a:blip>
-            <a:stretch>
-              <a:fillRect/>
-            </a:stretch>
-          </p:blipFill>
-          <p:spPr>
-            <a:xfrm>
-              <a:off x="2005742" y="2706838"/>
-              <a:ext cx="564636" cy="564636"/>
-            </a:xfrm>
-            <a:prstGeom prst="rect">
-              <a:avLst/>
-            </a:prstGeom>
-          </p:spPr>
-        </p:pic>
-        <p:sp>
-          <p:nvSpPr>
-            <p:cNvPr id="22" name="TextBox 21">
-              <a:extLst>
-                <a:ext uri="{FF2B5EF4-FFF2-40B4-BE49-F238E27FC236}">
-                  <a16:creationId xmlns:a16="http://schemas.microsoft.com/office/drawing/2014/main" id="{934E6490-056A-5978-DF16-99B26E56A4BD}"/>
-                </a:ext>
-              </a:extLst>
-            </p:cNvPr>
-            <p:cNvSpPr txBox="1"/>
-            <p:nvPr/>
-          </p:nvSpPr>
-          <p:spPr>
-            <a:xfrm>
-              <a:off x="2923116" y="1756614"/>
-              <a:ext cx="1155445" cy="646331"/>
-            </a:xfrm>
-            <a:prstGeom prst="rect">
-              <a:avLst/>
-            </a:prstGeom>
-            <a:noFill/>
-          </p:spPr>
-          <p:txBody>
-            <a:bodyPr wrap="none" rtlCol="0">
-              <a:spAutoFit/>
-            </a:bodyPr>
-            <a:lstStyle/>
-            <a:p>
-              <a:pPr algn="ctr"/>
-              <a:r>
-                <a:rPr lang="en-US" dirty="0"/>
-                <a:t>ESP-Home</a:t>
-              </a:r>
-              <a:br>
-                <a:rPr lang="en-US" dirty="0"/>
-              </a:br>
-              <a:r>
-                <a:rPr lang="en-US" dirty="0"/>
-                <a:t>Device</a:t>
-              </a:r>
-            </a:p>
-          </p:txBody>
-        </p:sp>
-        <p:sp>
-          <p:nvSpPr>
-            <p:cNvPr id="23" name="TextBox 22">
-              <a:extLst>
-                <a:ext uri="{FF2B5EF4-FFF2-40B4-BE49-F238E27FC236}">
-                  <a16:creationId xmlns:a16="http://schemas.microsoft.com/office/drawing/2014/main" id="{F0DC70C8-0BD9-8E45-C236-1DEF45454B1E}"/>
-                </a:ext>
-              </a:extLst>
-            </p:cNvPr>
-            <p:cNvSpPr txBox="1"/>
-            <p:nvPr/>
-          </p:nvSpPr>
-          <p:spPr>
-            <a:xfrm>
-              <a:off x="4332697" y="4942751"/>
-              <a:ext cx="1253933" cy="923330"/>
-            </a:xfrm>
-            <a:prstGeom prst="rect">
-              <a:avLst/>
-            </a:prstGeom>
-            <a:noFill/>
-          </p:spPr>
-          <p:txBody>
-            <a:bodyPr wrap="none" rtlCol="0">
-              <a:spAutoFit/>
-            </a:bodyPr>
-            <a:lstStyle/>
-            <a:p>
-              <a:pPr algn="ctr"/>
-              <a:r>
-                <a:rPr lang="en-US" dirty="0"/>
-                <a:t>FOSSiBOT</a:t>
-              </a:r>
-              <a:br>
-                <a:rPr lang="en-US" dirty="0"/>
-              </a:br>
-              <a:r>
-                <a:rPr lang="en-US" dirty="0"/>
-                <a:t>SYDPOWER</a:t>
-              </a:r>
-              <a:br>
-                <a:rPr lang="en-US" dirty="0"/>
-              </a:br>
-              <a:r>
-                <a:rPr lang="en-US" dirty="0"/>
-                <a:t>AFERIY</a:t>
-              </a:r>
-            </a:p>
-          </p:txBody>
-        </p:sp>
-        <p:sp>
-          <p:nvSpPr>
-            <p:cNvPr id="24" name="TextBox 23">
-              <a:extLst>
-                <a:ext uri="{FF2B5EF4-FFF2-40B4-BE49-F238E27FC236}">
-                  <a16:creationId xmlns:a16="http://schemas.microsoft.com/office/drawing/2014/main" id="{98123406-0C99-74CA-A857-6B1A031B6057}"/>
-                </a:ext>
-              </a:extLst>
-            </p:cNvPr>
-            <p:cNvSpPr txBox="1"/>
-            <p:nvPr/>
-          </p:nvSpPr>
-          <p:spPr>
-            <a:xfrm>
-              <a:off x="4689956" y="3363385"/>
-              <a:ext cx="1464055" cy="923330"/>
-            </a:xfrm>
-            <a:prstGeom prst="rect">
-              <a:avLst/>
-            </a:prstGeom>
-            <a:noFill/>
-          </p:spPr>
-          <p:txBody>
-            <a:bodyPr wrap="none" rtlCol="0">
-              <a:spAutoFit/>
-            </a:bodyPr>
-            <a:lstStyle/>
-            <a:p>
-              <a:pPr algn="ctr"/>
-              <a:r>
-                <a:rPr lang="en-US" b="1" dirty="0"/>
-                <a:t>Fully local</a:t>
-              </a:r>
-              <a:br>
-                <a:rPr lang="en-US" b="1" dirty="0"/>
-              </a:br>
-              <a:r>
-                <a:rPr lang="en-US" b="1" dirty="0"/>
-                <a:t>Battery</a:t>
-              </a:r>
-              <a:br>
-                <a:rPr lang="en-US" b="1" dirty="0"/>
-              </a:br>
-              <a:r>
-                <a:rPr lang="en-US" b="1" dirty="0"/>
-                <a:t>Management</a:t>
-              </a:r>
-            </a:p>
-          </p:txBody>
-        </p:sp>
-        <p:cxnSp>
-          <p:nvCxnSpPr>
-            <p:cNvPr id="28" name="Straight Connector 27">
-              <a:extLst>
-                <a:ext uri="{FF2B5EF4-FFF2-40B4-BE49-F238E27FC236}">
-                  <a16:creationId xmlns:a16="http://schemas.microsoft.com/office/drawing/2014/main" id="{B7E1474F-78AF-E55D-6FCF-EAE10EE55075}"/>
-                </a:ext>
-              </a:extLst>
-            </p:cNvPr>
-            <p:cNvCxnSpPr/>
-            <p:nvPr/>
-          </p:nvCxnSpPr>
-          <p:spPr>
-            <a:xfrm flipV="1">
-              <a:off x="5929460" y="3271474"/>
-              <a:ext cx="675910" cy="544025"/>
-            </a:xfrm>
-            <a:prstGeom prst="line">
-              <a:avLst/>
-            </a:prstGeom>
-          </p:spPr>
-          <p:style>
-            <a:lnRef idx="1">
-              <a:schemeClr val="accent1"/>
-            </a:lnRef>
-            <a:fillRef idx="0">
-              <a:schemeClr val="accent1"/>
-            </a:fillRef>
-            <a:effectRef idx="0">
-              <a:schemeClr val="accent1"/>
-            </a:effectRef>
-            <a:fontRef idx="minor">
-              <a:schemeClr val="tx1"/>
-            </a:fontRef>
-          </p:style>
-        </p:cxnSp>
       </p:grpSp>
+      <p:sp>
+        <p:nvSpPr>
+          <p:cNvPr id="13" name="TextBox 12">
+            <a:extLst>
+              <a:ext uri="{FF2B5EF4-FFF2-40B4-BE49-F238E27FC236}">
+                <a16:creationId xmlns:a16="http://schemas.microsoft.com/office/drawing/2014/main" id="{6AA23F15-FEF3-A611-ABBA-507F4FEAE605}"/>
+              </a:ext>
+            </a:extLst>
+          </p:cNvPr>
+          <p:cNvSpPr txBox="1"/>
+          <p:nvPr/>
+        </p:nvSpPr>
+        <p:spPr>
+          <a:xfrm>
+            <a:off x="5586630" y="1996544"/>
+            <a:ext cx="1018740" cy="646331"/>
+          </a:xfrm>
+          <a:prstGeom prst="rect">
+            <a:avLst/>
+          </a:prstGeom>
+          <a:noFill/>
+        </p:spPr>
+        <p:txBody>
+          <a:bodyPr wrap="none" rtlCol="0">
+            <a:spAutoFit/>
+          </a:bodyPr>
+          <a:lstStyle/>
+          <a:p>
+            <a:pPr algn="ctr"/>
+            <a:r>
+              <a:rPr lang="en-US" dirty="0"/>
+              <a:t>Home</a:t>
+            </a:r>
+            <a:br>
+              <a:rPr lang="en-US" dirty="0"/>
+            </a:br>
+            <a:r>
+              <a:rPr lang="en-US" dirty="0"/>
+              <a:t>Assistant</a:t>
+            </a:r>
+          </a:p>
+        </p:txBody>
+      </p:sp>
+      <p:pic>
+        <p:nvPicPr>
+          <p:cNvPr id="17" name="Picture 16">
+            <a:extLst>
+              <a:ext uri="{FF2B5EF4-FFF2-40B4-BE49-F238E27FC236}">
+                <a16:creationId xmlns:a16="http://schemas.microsoft.com/office/drawing/2014/main" id="{C88F0C50-D978-2516-3012-3846082C667C}"/>
+              </a:ext>
+            </a:extLst>
+          </p:cNvPr>
+          <p:cNvPicPr>
+            <a:picLocks noChangeAspect="1"/>
+          </p:cNvPicPr>
+          <p:nvPr/>
+        </p:nvPicPr>
+        <p:blipFill>
+          <a:blip r:embed="rId6"/>
+          <a:stretch>
+            <a:fillRect/>
+          </a:stretch>
+        </p:blipFill>
+        <p:spPr>
+          <a:xfrm>
+            <a:off x="1756326" y="823176"/>
+            <a:ext cx="1519576" cy="1370305"/>
+          </a:xfrm>
+          <a:prstGeom prst="rect">
+            <a:avLst/>
+          </a:prstGeom>
+          <a:effectLst>
+            <a:outerShdw blurRad="177800" dist="38100" dir="5400000" sx="101000" sy="101000" algn="t" rotWithShape="0">
+              <a:prstClr val="black">
+                <a:alpha val="40000"/>
+              </a:prstClr>
+            </a:outerShdw>
+          </a:effectLst>
+        </p:spPr>
+      </p:pic>
+      <p:pic>
+        <p:nvPicPr>
+          <p:cNvPr id="19" name="Picture 18">
+            <a:extLst>
+              <a:ext uri="{FF2B5EF4-FFF2-40B4-BE49-F238E27FC236}">
+                <a16:creationId xmlns:a16="http://schemas.microsoft.com/office/drawing/2014/main" id="{D3C260F8-04C1-59AB-D2B8-96838699FC96}"/>
+              </a:ext>
+            </a:extLst>
+          </p:cNvPr>
+          <p:cNvPicPr>
+            <a:picLocks noChangeAspect="1"/>
+          </p:cNvPicPr>
+          <p:nvPr/>
+        </p:nvPicPr>
+        <p:blipFill>
+          <a:blip r:embed="rId7">
+            <a:extLst>
+              <a:ext uri="{28A0092B-C50C-407E-A947-70E740481C1C}">
+                <a14:useLocalDpi xmlns:a14="http://schemas.microsoft.com/office/drawing/2010/main" val="0"/>
+              </a:ext>
+            </a:extLst>
+          </a:blip>
+          <a:stretch>
+            <a:fillRect/>
+          </a:stretch>
+        </p:blipFill>
+        <p:spPr>
+          <a:xfrm>
+            <a:off x="3799005" y="550535"/>
+            <a:ext cx="785904" cy="639366"/>
+          </a:xfrm>
+          <a:prstGeom prst="rect">
+            <a:avLst/>
+          </a:prstGeom>
+        </p:spPr>
+      </p:pic>
+      <p:pic>
+        <p:nvPicPr>
+          <p:cNvPr id="21" name="Picture 20">
+            <a:extLst>
+              <a:ext uri="{FF2B5EF4-FFF2-40B4-BE49-F238E27FC236}">
+                <a16:creationId xmlns:a16="http://schemas.microsoft.com/office/drawing/2014/main" id="{52FCB469-2458-1902-CCBD-C2642C59AC28}"/>
+              </a:ext>
+            </a:extLst>
+          </p:cNvPr>
+          <p:cNvPicPr>
+            <a:picLocks noChangeAspect="1"/>
+          </p:cNvPicPr>
+          <p:nvPr/>
+        </p:nvPicPr>
+        <p:blipFill>
+          <a:blip r:embed="rId8">
+            <a:extLst>
+              <a:ext uri="{28A0092B-C50C-407E-A947-70E740481C1C}">
+                <a14:useLocalDpi xmlns:a14="http://schemas.microsoft.com/office/drawing/2010/main" val="0"/>
+              </a:ext>
+            </a:extLst>
+          </a:blip>
+          <a:stretch>
+            <a:fillRect/>
+          </a:stretch>
+        </p:blipFill>
+        <p:spPr>
+          <a:xfrm>
+            <a:off x="2005742" y="2706838"/>
+            <a:ext cx="564636" cy="564636"/>
+          </a:xfrm>
+          <a:prstGeom prst="rect">
+            <a:avLst/>
+          </a:prstGeom>
+        </p:spPr>
+      </p:pic>
+      <p:sp>
+        <p:nvSpPr>
+          <p:cNvPr id="22" name="TextBox 21">
+            <a:extLst>
+              <a:ext uri="{FF2B5EF4-FFF2-40B4-BE49-F238E27FC236}">
+                <a16:creationId xmlns:a16="http://schemas.microsoft.com/office/drawing/2014/main" id="{934E6490-056A-5978-DF16-99B26E56A4BD}"/>
+              </a:ext>
+            </a:extLst>
+          </p:cNvPr>
+          <p:cNvSpPr txBox="1"/>
+          <p:nvPr/>
+        </p:nvSpPr>
+        <p:spPr>
+          <a:xfrm>
+            <a:off x="2923116" y="1756614"/>
+            <a:ext cx="1155445" cy="646331"/>
+          </a:xfrm>
+          <a:prstGeom prst="rect">
+            <a:avLst/>
+          </a:prstGeom>
+          <a:noFill/>
+        </p:spPr>
+        <p:txBody>
+          <a:bodyPr wrap="none" rtlCol="0">
+            <a:spAutoFit/>
+          </a:bodyPr>
+          <a:lstStyle/>
+          <a:p>
+            <a:pPr algn="ctr"/>
+            <a:r>
+              <a:rPr lang="en-US" dirty="0"/>
+              <a:t>ESP-Home</a:t>
+            </a:r>
+            <a:br>
+              <a:rPr lang="en-US" dirty="0"/>
+            </a:br>
+            <a:r>
+              <a:rPr lang="en-US" dirty="0"/>
+              <a:t>Device</a:t>
+            </a:r>
+          </a:p>
+        </p:txBody>
+      </p:sp>
+      <p:sp>
+        <p:nvSpPr>
+          <p:cNvPr id="23" name="TextBox 22">
+            <a:extLst>
+              <a:ext uri="{FF2B5EF4-FFF2-40B4-BE49-F238E27FC236}">
+                <a16:creationId xmlns:a16="http://schemas.microsoft.com/office/drawing/2014/main" id="{F0DC70C8-0BD9-8E45-C236-1DEF45454B1E}"/>
+              </a:ext>
+            </a:extLst>
+          </p:cNvPr>
+          <p:cNvSpPr txBox="1"/>
+          <p:nvPr/>
+        </p:nvSpPr>
+        <p:spPr>
+          <a:xfrm>
+            <a:off x="4332697" y="4942751"/>
+            <a:ext cx="1253933" cy="923330"/>
+          </a:xfrm>
+          <a:prstGeom prst="rect">
+            <a:avLst/>
+          </a:prstGeom>
+          <a:noFill/>
+        </p:spPr>
+        <p:txBody>
+          <a:bodyPr wrap="none" rtlCol="0">
+            <a:spAutoFit/>
+          </a:bodyPr>
+          <a:lstStyle/>
+          <a:p>
+            <a:pPr algn="ctr"/>
+            <a:r>
+              <a:rPr lang="en-US" dirty="0"/>
+              <a:t>FOSSiBOT</a:t>
+            </a:r>
+            <a:br>
+              <a:rPr lang="en-US" dirty="0"/>
+            </a:br>
+            <a:r>
+              <a:rPr lang="en-US" dirty="0"/>
+              <a:t>SYDPOWER</a:t>
+            </a:r>
+            <a:br>
+              <a:rPr lang="en-US" dirty="0"/>
+            </a:br>
+            <a:r>
+              <a:rPr lang="en-US" dirty="0"/>
+              <a:t>AFERIY</a:t>
+            </a:r>
+          </a:p>
+        </p:txBody>
+      </p:sp>
+      <p:sp>
+        <p:nvSpPr>
+          <p:cNvPr id="24" name="TextBox 23">
+            <a:extLst>
+              <a:ext uri="{FF2B5EF4-FFF2-40B4-BE49-F238E27FC236}">
+                <a16:creationId xmlns:a16="http://schemas.microsoft.com/office/drawing/2014/main" id="{98123406-0C99-74CA-A857-6B1A031B6057}"/>
+              </a:ext>
+            </a:extLst>
+          </p:cNvPr>
+          <p:cNvSpPr txBox="1"/>
+          <p:nvPr/>
+        </p:nvSpPr>
+        <p:spPr>
+          <a:xfrm>
+            <a:off x="4689956" y="3363385"/>
+            <a:ext cx="1464055" cy="923330"/>
+          </a:xfrm>
+          <a:prstGeom prst="rect">
+            <a:avLst/>
+          </a:prstGeom>
+          <a:noFill/>
+        </p:spPr>
+        <p:txBody>
+          <a:bodyPr wrap="none" rtlCol="0">
+            <a:spAutoFit/>
+          </a:bodyPr>
+          <a:lstStyle/>
+          <a:p>
+            <a:pPr algn="ctr"/>
+            <a:r>
+              <a:rPr lang="en-US" b="1" dirty="0"/>
+              <a:t>Fully local</a:t>
+            </a:r>
+            <a:br>
+              <a:rPr lang="en-US" b="1" dirty="0"/>
+            </a:br>
+            <a:r>
+              <a:rPr lang="en-US" b="1" dirty="0"/>
+              <a:t>Battery</a:t>
+            </a:r>
+            <a:br>
+              <a:rPr lang="en-US" b="1" dirty="0"/>
+            </a:br>
+            <a:r>
+              <a:rPr lang="en-US" b="1" dirty="0"/>
+              <a:t>Management</a:t>
+            </a:r>
+          </a:p>
+        </p:txBody>
+      </p:sp>
+      <p:cxnSp>
+        <p:nvCxnSpPr>
+          <p:cNvPr id="28" name="Straight Connector 27">
+            <a:extLst>
+              <a:ext uri="{FF2B5EF4-FFF2-40B4-BE49-F238E27FC236}">
+                <a16:creationId xmlns:a16="http://schemas.microsoft.com/office/drawing/2014/main" id="{B7E1474F-78AF-E55D-6FCF-EAE10EE55075}"/>
+              </a:ext>
+            </a:extLst>
+          </p:cNvPr>
+          <p:cNvCxnSpPr/>
+          <p:nvPr/>
+        </p:nvCxnSpPr>
+        <p:spPr>
+          <a:xfrm flipV="1">
+            <a:off x="5929460" y="3271474"/>
+            <a:ext cx="675910" cy="544025"/>
+          </a:xfrm>
+          <a:prstGeom prst="line">
+            <a:avLst/>
+          </a:prstGeom>
+        </p:spPr>
+        <p:style>
+          <a:lnRef idx="1">
+            <a:schemeClr val="accent1"/>
+          </a:lnRef>
+          <a:fillRef idx="0">
+            <a:schemeClr val="accent1"/>
+          </a:fillRef>
+          <a:effectRef idx="0">
+            <a:schemeClr val="accent1"/>
+          </a:effectRef>
+          <a:fontRef idx="minor">
+            <a:schemeClr val="tx1"/>
+          </a:fontRef>
+        </p:style>
+      </p:cxnSp>
     </p:spTree>
     <p:extLst>
       <p:ext uri="{BB962C8B-B14F-4D97-AF65-F5344CB8AC3E}">
@@ -5356,6 +5336,1129 @@
 </p:sld>
 </file>
 
+<file path=ppt/slides/slide4.xml><?xml version="1.0" encoding="utf-8"?>
+<p:sld xmlns:a="http://schemas.openxmlformats.org/drawingml/2006/main" xmlns:r="http://schemas.openxmlformats.org/officeDocument/2006/relationships" xmlns:p="http://schemas.openxmlformats.org/presentationml/2006/main">
+  <p:cSld>
+    <p:spTree>
+      <p:nvGrpSpPr>
+        <p:cNvPr id="1" name="">
+          <a:extLst>
+            <a:ext uri="{FF2B5EF4-FFF2-40B4-BE49-F238E27FC236}">
+              <a16:creationId xmlns:a16="http://schemas.microsoft.com/office/drawing/2014/main" id="{3D8EA4B3-B394-EF34-7CBD-3D10DF6E9951}"/>
+            </a:ext>
+          </a:extLst>
+        </p:cNvPr>
+        <p:cNvGrpSpPr/>
+        <p:nvPr/>
+      </p:nvGrpSpPr>
+      <p:grpSpPr>
+        <a:xfrm>
+          <a:off x="0" y="0"/>
+          <a:ext cx="0" cy="0"/>
+          <a:chOff x="0" y="0"/>
+          <a:chExt cx="0" cy="0"/>
+        </a:xfrm>
+      </p:grpSpPr>
+      <p:grpSp>
+        <p:nvGrpSpPr>
+          <p:cNvPr id="37" name="Group 36">
+            <a:extLst>
+              <a:ext uri="{FF2B5EF4-FFF2-40B4-BE49-F238E27FC236}">
+                <a16:creationId xmlns:a16="http://schemas.microsoft.com/office/drawing/2014/main" id="{B2600055-C224-B1E1-614B-066D7D2D2F70}"/>
+              </a:ext>
+            </a:extLst>
+          </p:cNvPr>
+          <p:cNvGrpSpPr/>
+          <p:nvPr/>
+        </p:nvGrpSpPr>
+        <p:grpSpPr>
+          <a:xfrm>
+            <a:off x="2710858" y="768448"/>
+            <a:ext cx="7382245" cy="5321104"/>
+            <a:chOff x="2091733" y="253814"/>
+            <a:chExt cx="7382245" cy="5321104"/>
+          </a:xfrm>
+        </p:grpSpPr>
+        <p:pic>
+          <p:nvPicPr>
+            <p:cNvPr id="36" name="Picture 35">
+              <a:extLst>
+                <a:ext uri="{FF2B5EF4-FFF2-40B4-BE49-F238E27FC236}">
+                  <a16:creationId xmlns:a16="http://schemas.microsoft.com/office/drawing/2014/main" id="{C37ACF22-64E5-DF77-A868-DE0985A1CDEB}"/>
+                </a:ext>
+              </a:extLst>
+            </p:cNvPr>
+            <p:cNvPicPr>
+              <a:picLocks noChangeAspect="1"/>
+            </p:cNvPicPr>
+            <p:nvPr/>
+          </p:nvPicPr>
+          <p:blipFill>
+            <a:blip r:embed="rId2">
+              <a:extLst>
+                <a:ext uri="{28A0092B-C50C-407E-A947-70E740481C1C}">
+                  <a14:useLocalDpi xmlns:a14="http://schemas.microsoft.com/office/drawing/2010/main" val="0"/>
+                </a:ext>
+              </a:extLst>
+            </a:blip>
+            <a:stretch>
+              <a:fillRect/>
+            </a:stretch>
+          </p:blipFill>
+          <p:spPr>
+            <a:xfrm>
+              <a:off x="3958313" y="1063166"/>
+              <a:ext cx="785904" cy="639366"/>
+            </a:xfrm>
+            <a:prstGeom prst="rect">
+              <a:avLst/>
+            </a:prstGeom>
+          </p:spPr>
+        </p:pic>
+        <p:sp>
+          <p:nvSpPr>
+            <p:cNvPr id="35" name="Freeform: Shape 34">
+              <a:extLst>
+                <a:ext uri="{FF2B5EF4-FFF2-40B4-BE49-F238E27FC236}">
+                  <a16:creationId xmlns:a16="http://schemas.microsoft.com/office/drawing/2014/main" id="{AE516F73-E086-4335-74AB-0E41D5404C7F}"/>
+                </a:ext>
+              </a:extLst>
+            </p:cNvPr>
+            <p:cNvSpPr/>
+            <p:nvPr/>
+          </p:nvSpPr>
+          <p:spPr>
+            <a:xfrm>
+              <a:off x="3181350" y="885825"/>
+              <a:ext cx="1038332" cy="2552700"/>
+            </a:xfrm>
+            <a:custGeom>
+              <a:avLst/>
+              <a:gdLst>
+                <a:gd name="connsiteX0" fmla="*/ 1038225 w 1038332"/>
+                <a:gd name="connsiteY0" fmla="*/ 2552700 h 2552700"/>
+                <a:gd name="connsiteX1" fmla="*/ 866775 w 1038332"/>
+                <a:gd name="connsiteY1" fmla="*/ 733425 h 2552700"/>
+                <a:gd name="connsiteX2" fmla="*/ 0 w 1038332"/>
+                <a:gd name="connsiteY2" fmla="*/ 0 h 2552700"/>
+              </a:gdLst>
+              <a:ahLst/>
+              <a:cxnLst>
+                <a:cxn ang="0">
+                  <a:pos x="connsiteX0" y="connsiteY0"/>
+                </a:cxn>
+                <a:cxn ang="0">
+                  <a:pos x="connsiteX1" y="connsiteY1"/>
+                </a:cxn>
+                <a:cxn ang="0">
+                  <a:pos x="connsiteX2" y="connsiteY2"/>
+                </a:cxn>
+              </a:cxnLst>
+              <a:rect l="l" t="t" r="r" b="b"/>
+              <a:pathLst>
+                <a:path w="1038332" h="2552700">
+                  <a:moveTo>
+                    <a:pt x="1038225" y="2552700"/>
+                  </a:moveTo>
+                  <a:cubicBezTo>
+                    <a:pt x="1039018" y="1855787"/>
+                    <a:pt x="1039812" y="1158875"/>
+                    <a:pt x="866775" y="733425"/>
+                  </a:cubicBezTo>
+                  <a:cubicBezTo>
+                    <a:pt x="693738" y="307975"/>
+                    <a:pt x="346869" y="153987"/>
+                    <a:pt x="0" y="0"/>
+                  </a:cubicBezTo>
+                </a:path>
+              </a:pathLst>
+            </a:custGeom>
+            <a:noFill/>
+            <a:ln w="38100">
+              <a:solidFill>
+                <a:schemeClr val="accent3"/>
+              </a:solidFill>
+              <a:prstDash val="sysDash"/>
+              <a:tailEnd type="triangle"/>
+            </a:ln>
+          </p:spPr>
+          <p:style>
+            <a:lnRef idx="2">
+              <a:schemeClr val="accent1">
+                <a:shade val="15000"/>
+              </a:schemeClr>
+            </a:lnRef>
+            <a:fillRef idx="1">
+              <a:schemeClr val="accent1"/>
+            </a:fillRef>
+            <a:effectRef idx="0">
+              <a:schemeClr val="accent1"/>
+            </a:effectRef>
+            <a:fontRef idx="minor">
+              <a:schemeClr val="lt1"/>
+            </a:fontRef>
+          </p:style>
+          <p:txBody>
+            <a:bodyPr rtlCol="0" anchor="ctr"/>
+            <a:lstStyle/>
+            <a:p>
+              <a:pPr algn="ctr"/>
+              <a:endParaRPr lang="en-US"/>
+            </a:p>
+          </p:txBody>
+        </p:sp>
+        <p:sp>
+          <p:nvSpPr>
+            <p:cNvPr id="25" name="Freeform: Shape 24">
+              <a:extLst>
+                <a:ext uri="{FF2B5EF4-FFF2-40B4-BE49-F238E27FC236}">
+                  <a16:creationId xmlns:a16="http://schemas.microsoft.com/office/drawing/2014/main" id="{EB8B9658-C77B-92C1-40E4-0A73F40C6663}"/>
+                </a:ext>
+              </a:extLst>
+            </p:cNvPr>
+            <p:cNvSpPr/>
+            <p:nvPr/>
+          </p:nvSpPr>
+          <p:spPr>
+            <a:xfrm>
+              <a:off x="4257675" y="1716518"/>
+              <a:ext cx="3590925" cy="1969657"/>
+            </a:xfrm>
+            <a:custGeom>
+              <a:avLst/>
+              <a:gdLst>
+                <a:gd name="connsiteX0" fmla="*/ 0 w 3590925"/>
+                <a:gd name="connsiteY0" fmla="*/ 1969657 h 1969657"/>
+                <a:gd name="connsiteX1" fmla="*/ 1390650 w 3590925"/>
+                <a:gd name="connsiteY1" fmla="*/ 93232 h 1969657"/>
+                <a:gd name="connsiteX2" fmla="*/ 3590925 w 3590925"/>
+                <a:gd name="connsiteY2" fmla="*/ 455182 h 1969657"/>
+              </a:gdLst>
+              <a:ahLst/>
+              <a:cxnLst>
+                <a:cxn ang="0">
+                  <a:pos x="connsiteX0" y="connsiteY0"/>
+                </a:cxn>
+                <a:cxn ang="0">
+                  <a:pos x="connsiteX1" y="connsiteY1"/>
+                </a:cxn>
+                <a:cxn ang="0">
+                  <a:pos x="connsiteX2" y="connsiteY2"/>
+                </a:cxn>
+              </a:cxnLst>
+              <a:rect l="l" t="t" r="r" b="b"/>
+              <a:pathLst>
+                <a:path w="3590925" h="1969657">
+                  <a:moveTo>
+                    <a:pt x="0" y="1969657"/>
+                  </a:moveTo>
+                  <a:cubicBezTo>
+                    <a:pt x="396081" y="1157650"/>
+                    <a:pt x="792163" y="345644"/>
+                    <a:pt x="1390650" y="93232"/>
+                  </a:cubicBezTo>
+                  <a:cubicBezTo>
+                    <a:pt x="1989138" y="-159181"/>
+                    <a:pt x="2790031" y="148000"/>
+                    <a:pt x="3590925" y="455182"/>
+                  </a:cubicBezTo>
+                </a:path>
+              </a:pathLst>
+            </a:custGeom>
+            <a:noFill/>
+            <a:ln w="38100">
+              <a:solidFill>
+                <a:schemeClr val="accent3"/>
+              </a:solidFill>
+              <a:prstDash val="sysDash"/>
+              <a:tailEnd type="triangle"/>
+            </a:ln>
+          </p:spPr>
+          <p:style>
+            <a:lnRef idx="2">
+              <a:schemeClr val="accent1">
+                <a:shade val="15000"/>
+              </a:schemeClr>
+            </a:lnRef>
+            <a:fillRef idx="1">
+              <a:schemeClr val="accent1"/>
+            </a:fillRef>
+            <a:effectRef idx="0">
+              <a:schemeClr val="accent1"/>
+            </a:effectRef>
+            <a:fontRef idx="minor">
+              <a:schemeClr val="lt1"/>
+            </a:fontRef>
+          </p:style>
+          <p:txBody>
+            <a:bodyPr rtlCol="0" anchor="ctr"/>
+            <a:lstStyle/>
+            <a:p>
+              <a:pPr algn="ctr"/>
+              <a:endParaRPr lang="en-US"/>
+            </a:p>
+          </p:txBody>
+        </p:sp>
+        <p:pic>
+          <p:nvPicPr>
+            <p:cNvPr id="8" name="Picture 7">
+              <a:extLst>
+                <a:ext uri="{FF2B5EF4-FFF2-40B4-BE49-F238E27FC236}">
+                  <a16:creationId xmlns:a16="http://schemas.microsoft.com/office/drawing/2014/main" id="{8FFA24E9-B4C6-DD5D-8C29-81281A7795FD}"/>
+                </a:ext>
+              </a:extLst>
+            </p:cNvPr>
+            <p:cNvPicPr>
+              <a:picLocks noChangeAspect="1"/>
+            </p:cNvPicPr>
+            <p:nvPr/>
+          </p:nvPicPr>
+          <p:blipFill>
+            <a:blip r:embed="rId3"/>
+            <a:stretch>
+              <a:fillRect/>
+            </a:stretch>
+          </p:blipFill>
+          <p:spPr>
+            <a:xfrm rot="5400000">
+              <a:off x="2987341" y="2650978"/>
+              <a:ext cx="1243186" cy="2505424"/>
+            </a:xfrm>
+            <a:prstGeom prst="rect">
+              <a:avLst/>
+            </a:prstGeom>
+            <a:effectLst>
+              <a:outerShdw blurRad="177800" dist="38100" dir="5400000" sx="103000" sy="103000" algn="t" rotWithShape="0">
+                <a:prstClr val="black">
+                  <a:alpha val="40000"/>
+                </a:prstClr>
+              </a:outerShdw>
+            </a:effectLst>
+          </p:spPr>
+        </p:pic>
+        <p:cxnSp>
+          <p:nvCxnSpPr>
+            <p:cNvPr id="21" name="Straight Connector 20">
+              <a:extLst>
+                <a:ext uri="{FF2B5EF4-FFF2-40B4-BE49-F238E27FC236}">
+                  <a16:creationId xmlns:a16="http://schemas.microsoft.com/office/drawing/2014/main" id="{B7E8E450-5322-07D8-95D7-F32BFCFA9C8E}"/>
+                </a:ext>
+              </a:extLst>
+            </p:cNvPr>
+            <p:cNvCxnSpPr>
+              <a:stCxn id="13" idx="3"/>
+            </p:cNvCxnSpPr>
+            <p:nvPr/>
+          </p:nvCxnSpPr>
+          <p:spPr>
+            <a:xfrm flipV="1">
+              <a:off x="7176252" y="3937498"/>
+              <a:ext cx="634247" cy="201309"/>
+            </a:xfrm>
+            <a:prstGeom prst="line">
+              <a:avLst/>
+            </a:prstGeom>
+          </p:spPr>
+          <p:style>
+            <a:lnRef idx="1">
+              <a:schemeClr val="accent1"/>
+            </a:lnRef>
+            <a:fillRef idx="0">
+              <a:schemeClr val="accent1"/>
+            </a:fillRef>
+            <a:effectRef idx="0">
+              <a:schemeClr val="accent1"/>
+            </a:effectRef>
+            <a:fontRef idx="minor">
+              <a:schemeClr val="tx1"/>
+            </a:fontRef>
+          </p:style>
+        </p:cxnSp>
+        <p:pic>
+          <p:nvPicPr>
+            <p:cNvPr id="24" name="Picture 23">
+              <a:extLst>
+                <a:ext uri="{FF2B5EF4-FFF2-40B4-BE49-F238E27FC236}">
+                  <a16:creationId xmlns:a16="http://schemas.microsoft.com/office/drawing/2014/main" id="{71F6D877-A880-F119-0604-F987A4B9C7E7}"/>
+                </a:ext>
+              </a:extLst>
+            </p:cNvPr>
+            <p:cNvPicPr>
+              <a:picLocks noChangeAspect="1"/>
+            </p:cNvPicPr>
+            <p:nvPr/>
+          </p:nvPicPr>
+          <p:blipFill>
+            <a:blip r:embed="rId4"/>
+            <a:stretch>
+              <a:fillRect/>
+            </a:stretch>
+          </p:blipFill>
+          <p:spPr>
+            <a:xfrm>
+              <a:off x="7324913" y="1733115"/>
+              <a:ext cx="2149065" cy="3038459"/>
+            </a:xfrm>
+            <a:prstGeom prst="rect">
+              <a:avLst/>
+            </a:prstGeom>
+          </p:spPr>
+        </p:pic>
+        <p:pic>
+          <p:nvPicPr>
+            <p:cNvPr id="4" name="Picture 3">
+              <a:extLst>
+                <a:ext uri="{FF2B5EF4-FFF2-40B4-BE49-F238E27FC236}">
+                  <a16:creationId xmlns:a16="http://schemas.microsoft.com/office/drawing/2014/main" id="{934CD8A7-DD93-5BDD-D783-065B4EF61236}"/>
+                </a:ext>
+              </a:extLst>
+            </p:cNvPr>
+            <p:cNvPicPr>
+              <a:picLocks noChangeAspect="1"/>
+            </p:cNvPicPr>
+            <p:nvPr/>
+          </p:nvPicPr>
+          <p:blipFill>
+            <a:blip r:embed="rId5">
+              <a:extLst>
+                <a:ext uri="{28A0092B-C50C-407E-A947-70E740481C1C}">
+                  <a14:useLocalDpi xmlns:a14="http://schemas.microsoft.com/office/drawing/2010/main" val="0"/>
+                </a:ext>
+              </a:extLst>
+            </a:blip>
+            <a:stretch>
+              <a:fillRect/>
+            </a:stretch>
+          </p:blipFill>
+          <p:spPr>
+            <a:xfrm>
+              <a:off x="5042075" y="2226189"/>
+              <a:ext cx="564636" cy="564636"/>
+            </a:xfrm>
+            <a:prstGeom prst="rect">
+              <a:avLst/>
+            </a:prstGeom>
+          </p:spPr>
+        </p:pic>
+        <p:sp>
+          <p:nvSpPr>
+            <p:cNvPr id="7" name="TextBox 6">
+              <a:extLst>
+                <a:ext uri="{FF2B5EF4-FFF2-40B4-BE49-F238E27FC236}">
+                  <a16:creationId xmlns:a16="http://schemas.microsoft.com/office/drawing/2014/main" id="{B0B53C4A-4188-3393-24C5-7372527D0A2B}"/>
+                </a:ext>
+              </a:extLst>
+            </p:cNvPr>
+            <p:cNvSpPr txBox="1"/>
+            <p:nvPr/>
+          </p:nvSpPr>
+          <p:spPr>
+            <a:xfrm>
+              <a:off x="2091733" y="2207950"/>
+              <a:ext cx="1606144" cy="646331"/>
+            </a:xfrm>
+            <a:prstGeom prst="rect">
+              <a:avLst/>
+            </a:prstGeom>
+            <a:noFill/>
+          </p:spPr>
+          <p:txBody>
+            <a:bodyPr wrap="none" rtlCol="0">
+              <a:spAutoFit/>
+            </a:bodyPr>
+            <a:lstStyle/>
+            <a:p>
+              <a:pPr algn="ctr"/>
+              <a:r>
+                <a:rPr lang="en-US" dirty="0"/>
+                <a:t>Turn on display</a:t>
+              </a:r>
+              <a:br>
+                <a:rPr lang="en-US" dirty="0"/>
+              </a:br>
+              <a:r>
+                <a:rPr lang="en-US" dirty="0"/>
+                <a:t>for 20 seconds.</a:t>
+              </a:r>
+            </a:p>
+          </p:txBody>
+        </p:sp>
+        <p:cxnSp>
+          <p:nvCxnSpPr>
+            <p:cNvPr id="9" name="Straight Arrow Connector 8">
+              <a:extLst>
+                <a:ext uri="{FF2B5EF4-FFF2-40B4-BE49-F238E27FC236}">
+                  <a16:creationId xmlns:a16="http://schemas.microsoft.com/office/drawing/2014/main" id="{33A4E143-57E8-98EC-9757-9BB696DE23C8}"/>
+                </a:ext>
+              </a:extLst>
+            </p:cNvPr>
+            <p:cNvCxnSpPr>
+              <a:cxnSpLocks/>
+            </p:cNvCxnSpPr>
+            <p:nvPr/>
+          </p:nvCxnSpPr>
+          <p:spPr>
+            <a:xfrm flipH="1">
+              <a:off x="2894805" y="2901948"/>
+              <a:ext cx="1" cy="880811"/>
+            </a:xfrm>
+            <a:prstGeom prst="straightConnector1">
+              <a:avLst/>
+            </a:prstGeom>
+            <a:ln w="60325">
+              <a:solidFill>
+                <a:schemeClr val="accent2"/>
+              </a:solidFill>
+              <a:tailEnd type="triangle"/>
+            </a:ln>
+          </p:spPr>
+          <p:style>
+            <a:lnRef idx="1">
+              <a:schemeClr val="accent1"/>
+            </a:lnRef>
+            <a:fillRef idx="0">
+              <a:schemeClr val="accent1"/>
+            </a:fillRef>
+            <a:effectRef idx="0">
+              <a:schemeClr val="accent1"/>
+            </a:effectRef>
+            <a:fontRef idx="minor">
+              <a:schemeClr val="tx1"/>
+            </a:fontRef>
+          </p:style>
+        </p:cxnSp>
+        <p:sp>
+          <p:nvSpPr>
+            <p:cNvPr id="10" name="TextBox 9">
+              <a:extLst>
+                <a:ext uri="{FF2B5EF4-FFF2-40B4-BE49-F238E27FC236}">
+                  <a16:creationId xmlns:a16="http://schemas.microsoft.com/office/drawing/2014/main" id="{F5BE5E6C-0829-7687-E678-C7929955485F}"/>
+                </a:ext>
+              </a:extLst>
+            </p:cNvPr>
+            <p:cNvSpPr txBox="1"/>
+            <p:nvPr/>
+          </p:nvSpPr>
+          <p:spPr>
+            <a:xfrm>
+              <a:off x="5918340" y="2096278"/>
+              <a:ext cx="1192827" cy="369332"/>
+            </a:xfrm>
+            <a:prstGeom prst="rect">
+              <a:avLst/>
+            </a:prstGeom>
+            <a:noFill/>
+          </p:spPr>
+          <p:txBody>
+            <a:bodyPr wrap="none" rtlCol="0">
+              <a:spAutoFit/>
+            </a:bodyPr>
+            <a:lstStyle/>
+            <a:p>
+              <a:r>
+                <a:rPr lang="en-US" dirty="0"/>
+                <a:t>USB Status</a:t>
+              </a:r>
+            </a:p>
+          </p:txBody>
+        </p:sp>
+        <p:sp>
+          <p:nvSpPr>
+            <p:cNvPr id="11" name="TextBox 10">
+              <a:extLst>
+                <a:ext uri="{FF2B5EF4-FFF2-40B4-BE49-F238E27FC236}">
+                  <a16:creationId xmlns:a16="http://schemas.microsoft.com/office/drawing/2014/main" id="{24235F00-57E8-5BEC-C8A0-2143D774201F}"/>
+                </a:ext>
+              </a:extLst>
+            </p:cNvPr>
+            <p:cNvSpPr txBox="1"/>
+            <p:nvPr/>
+          </p:nvSpPr>
+          <p:spPr>
+            <a:xfrm>
+              <a:off x="5720911" y="2717282"/>
+              <a:ext cx="1080617" cy="369332"/>
+            </a:xfrm>
+            <a:prstGeom prst="rect">
+              <a:avLst/>
+            </a:prstGeom>
+            <a:noFill/>
+          </p:spPr>
+          <p:txBody>
+            <a:bodyPr wrap="none" rtlCol="0">
+              <a:spAutoFit/>
+            </a:bodyPr>
+            <a:lstStyle/>
+            <a:p>
+              <a:r>
+                <a:rPr lang="en-US" dirty="0"/>
+                <a:t>DC Status</a:t>
+              </a:r>
+            </a:p>
+          </p:txBody>
+        </p:sp>
+        <p:sp>
+          <p:nvSpPr>
+            <p:cNvPr id="12" name="TextBox 11">
+              <a:extLst>
+                <a:ext uri="{FF2B5EF4-FFF2-40B4-BE49-F238E27FC236}">
+                  <a16:creationId xmlns:a16="http://schemas.microsoft.com/office/drawing/2014/main" id="{0A68F00F-DB77-FF5D-2870-CDBDE8F060AC}"/>
+                </a:ext>
+              </a:extLst>
+            </p:cNvPr>
+            <p:cNvSpPr txBox="1"/>
+            <p:nvPr/>
+          </p:nvSpPr>
+          <p:spPr>
+            <a:xfrm>
+              <a:off x="5729513" y="3252345"/>
+              <a:ext cx="1069332" cy="369332"/>
+            </a:xfrm>
+            <a:prstGeom prst="rect">
+              <a:avLst/>
+            </a:prstGeom>
+            <a:noFill/>
+          </p:spPr>
+          <p:txBody>
+            <a:bodyPr wrap="none" rtlCol="0">
+              <a:spAutoFit/>
+            </a:bodyPr>
+            <a:lstStyle/>
+            <a:p>
+              <a:r>
+                <a:rPr lang="en-US" dirty="0"/>
+                <a:t>AC Status</a:t>
+              </a:r>
+            </a:p>
+          </p:txBody>
+        </p:sp>
+        <p:sp>
+          <p:nvSpPr>
+            <p:cNvPr id="13" name="TextBox 12">
+              <a:extLst>
+                <a:ext uri="{FF2B5EF4-FFF2-40B4-BE49-F238E27FC236}">
+                  <a16:creationId xmlns:a16="http://schemas.microsoft.com/office/drawing/2014/main" id="{77F4ED16-2427-5017-B0E8-20C5622A69B1}"/>
+                </a:ext>
+              </a:extLst>
+            </p:cNvPr>
+            <p:cNvSpPr txBox="1"/>
+            <p:nvPr/>
+          </p:nvSpPr>
+          <p:spPr>
+            <a:xfrm>
+              <a:off x="5880384" y="3873349"/>
+              <a:ext cx="1295868" cy="530915"/>
+            </a:xfrm>
+            <a:prstGeom prst="rect">
+              <a:avLst/>
+            </a:prstGeom>
+            <a:noFill/>
+          </p:spPr>
+          <p:txBody>
+            <a:bodyPr wrap="none" rtlCol="0">
+              <a:spAutoFit/>
+            </a:bodyPr>
+            <a:lstStyle/>
+            <a:p>
+              <a:pPr algn="ctr"/>
+              <a:r>
+                <a:rPr lang="en-US" dirty="0"/>
+                <a:t>Toggle Light</a:t>
+              </a:r>
+              <a:br>
+                <a:rPr lang="en-US" dirty="0"/>
+              </a:br>
+              <a:r>
+                <a:rPr lang="en-US" sz="1050" dirty="0"/>
+                <a:t>(In back)</a:t>
+              </a:r>
+            </a:p>
+          </p:txBody>
+        </p:sp>
+        <p:cxnSp>
+          <p:nvCxnSpPr>
+            <p:cNvPr id="15" name="Straight Connector 14">
+              <a:extLst>
+                <a:ext uri="{FF2B5EF4-FFF2-40B4-BE49-F238E27FC236}">
+                  <a16:creationId xmlns:a16="http://schemas.microsoft.com/office/drawing/2014/main" id="{7A340D3B-E460-41A2-E6C9-E6FB28090DBB}"/>
+                </a:ext>
+              </a:extLst>
+            </p:cNvPr>
+            <p:cNvCxnSpPr>
+              <a:stCxn id="10" idx="3"/>
+            </p:cNvCxnSpPr>
+            <p:nvPr/>
+          </p:nvCxnSpPr>
+          <p:spPr>
+            <a:xfrm>
+              <a:off x="7111167" y="2280944"/>
+              <a:ext cx="1061282" cy="509881"/>
+            </a:xfrm>
+            <a:prstGeom prst="line">
+              <a:avLst/>
+            </a:prstGeom>
+          </p:spPr>
+          <p:style>
+            <a:lnRef idx="1">
+              <a:schemeClr val="accent1"/>
+            </a:lnRef>
+            <a:fillRef idx="0">
+              <a:schemeClr val="accent1"/>
+            </a:fillRef>
+            <a:effectRef idx="0">
+              <a:schemeClr val="accent1"/>
+            </a:effectRef>
+            <a:fontRef idx="minor">
+              <a:schemeClr val="tx1"/>
+            </a:fontRef>
+          </p:style>
+        </p:cxnSp>
+        <p:cxnSp>
+          <p:nvCxnSpPr>
+            <p:cNvPr id="17" name="Straight Connector 16">
+              <a:extLst>
+                <a:ext uri="{FF2B5EF4-FFF2-40B4-BE49-F238E27FC236}">
+                  <a16:creationId xmlns:a16="http://schemas.microsoft.com/office/drawing/2014/main" id="{6F141AA2-9F9E-B627-36D5-E796CBBA1808}"/>
+                </a:ext>
+              </a:extLst>
+            </p:cNvPr>
+            <p:cNvCxnSpPr>
+              <a:stCxn id="11" idx="3"/>
+            </p:cNvCxnSpPr>
+            <p:nvPr/>
+          </p:nvCxnSpPr>
+          <p:spPr>
+            <a:xfrm>
+              <a:off x="6801528" y="2901948"/>
+              <a:ext cx="1180421" cy="350397"/>
+            </a:xfrm>
+            <a:prstGeom prst="line">
+              <a:avLst/>
+            </a:prstGeom>
+          </p:spPr>
+          <p:style>
+            <a:lnRef idx="1">
+              <a:schemeClr val="accent1"/>
+            </a:lnRef>
+            <a:fillRef idx="0">
+              <a:schemeClr val="accent1"/>
+            </a:fillRef>
+            <a:effectRef idx="0">
+              <a:schemeClr val="accent1"/>
+            </a:effectRef>
+            <a:fontRef idx="minor">
+              <a:schemeClr val="tx1"/>
+            </a:fontRef>
+          </p:style>
+        </p:cxnSp>
+        <p:cxnSp>
+          <p:nvCxnSpPr>
+            <p:cNvPr id="19" name="Straight Connector 18">
+              <a:extLst>
+                <a:ext uri="{FF2B5EF4-FFF2-40B4-BE49-F238E27FC236}">
+                  <a16:creationId xmlns:a16="http://schemas.microsoft.com/office/drawing/2014/main" id="{F7798CD8-03C0-D955-1263-D30DF3D17AF3}"/>
+                </a:ext>
+              </a:extLst>
+            </p:cNvPr>
+            <p:cNvCxnSpPr>
+              <a:stCxn id="12" idx="3"/>
+            </p:cNvCxnSpPr>
+            <p:nvPr/>
+          </p:nvCxnSpPr>
+          <p:spPr>
+            <a:xfrm>
+              <a:off x="6798845" y="3437011"/>
+              <a:ext cx="1183104" cy="363464"/>
+            </a:xfrm>
+            <a:prstGeom prst="line">
+              <a:avLst/>
+            </a:prstGeom>
+          </p:spPr>
+          <p:style>
+            <a:lnRef idx="1">
+              <a:schemeClr val="accent1"/>
+            </a:lnRef>
+            <a:fillRef idx="0">
+              <a:schemeClr val="accent1"/>
+            </a:fillRef>
+            <a:effectRef idx="0">
+              <a:schemeClr val="accent1"/>
+            </a:effectRef>
+            <a:fontRef idx="minor">
+              <a:schemeClr val="tx1"/>
+            </a:fontRef>
+          </p:style>
+        </p:cxnSp>
+        <p:cxnSp>
+          <p:nvCxnSpPr>
+            <p:cNvPr id="14" name="Straight Arrow Connector 13">
+              <a:extLst>
+                <a:ext uri="{FF2B5EF4-FFF2-40B4-BE49-F238E27FC236}">
+                  <a16:creationId xmlns:a16="http://schemas.microsoft.com/office/drawing/2014/main" id="{913D5101-1E22-3462-28EC-8625DE670EDE}"/>
+                </a:ext>
+              </a:extLst>
+            </p:cNvPr>
+            <p:cNvCxnSpPr>
+              <a:cxnSpLocks/>
+            </p:cNvCxnSpPr>
+            <p:nvPr/>
+          </p:nvCxnSpPr>
+          <p:spPr>
+            <a:xfrm flipV="1">
+              <a:off x="4257675" y="4525283"/>
+              <a:ext cx="0" cy="344160"/>
+            </a:xfrm>
+            <a:prstGeom prst="straightConnector1">
+              <a:avLst/>
+            </a:prstGeom>
+            <a:ln w="60325">
+              <a:solidFill>
+                <a:schemeClr val="accent2"/>
+              </a:solidFill>
+              <a:tailEnd type="triangle"/>
+            </a:ln>
+          </p:spPr>
+          <p:style>
+            <a:lnRef idx="1">
+              <a:schemeClr val="accent1"/>
+            </a:lnRef>
+            <a:fillRef idx="0">
+              <a:schemeClr val="accent1"/>
+            </a:fillRef>
+            <a:effectRef idx="0">
+              <a:schemeClr val="accent1"/>
+            </a:effectRef>
+            <a:fontRef idx="minor">
+              <a:schemeClr val="tx1"/>
+            </a:fontRef>
+          </p:style>
+        </p:cxnSp>
+        <p:sp>
+          <p:nvSpPr>
+            <p:cNvPr id="18" name="TextBox 17">
+              <a:extLst>
+                <a:ext uri="{FF2B5EF4-FFF2-40B4-BE49-F238E27FC236}">
+                  <a16:creationId xmlns:a16="http://schemas.microsoft.com/office/drawing/2014/main" id="{F496622D-59F9-FB28-102B-D4106063C227}"/>
+                </a:ext>
+              </a:extLst>
+            </p:cNvPr>
+            <p:cNvSpPr txBox="1"/>
+            <p:nvPr/>
+          </p:nvSpPr>
+          <p:spPr>
+            <a:xfrm>
+              <a:off x="3483905" y="4928587"/>
+              <a:ext cx="1547539" cy="646331"/>
+            </a:xfrm>
+            <a:prstGeom prst="rect">
+              <a:avLst/>
+            </a:prstGeom>
+            <a:noFill/>
+          </p:spPr>
+          <p:txBody>
+            <a:bodyPr wrap="none" rtlCol="0">
+              <a:spAutoFit/>
+            </a:bodyPr>
+            <a:lstStyle/>
+            <a:p>
+              <a:pPr algn="ctr"/>
+              <a:r>
+                <a:rPr lang="en-US" dirty="0"/>
+                <a:t>Toggle light on</a:t>
+              </a:r>
+              <a:br>
+                <a:rPr lang="en-US" dirty="0"/>
+              </a:br>
+              <a:r>
+                <a:rPr lang="en-US" dirty="0"/>
+                <a:t>Power Station</a:t>
+              </a:r>
+            </a:p>
+          </p:txBody>
+        </p:sp>
+        <p:sp>
+          <p:nvSpPr>
+            <p:cNvPr id="23" name="TextBox 22">
+              <a:extLst>
+                <a:ext uri="{FF2B5EF4-FFF2-40B4-BE49-F238E27FC236}">
+                  <a16:creationId xmlns:a16="http://schemas.microsoft.com/office/drawing/2014/main" id="{FAFAE86B-3C54-B04A-2066-3586619DFD6B}"/>
+                </a:ext>
+              </a:extLst>
+            </p:cNvPr>
+            <p:cNvSpPr txBox="1"/>
+            <p:nvPr/>
+          </p:nvSpPr>
+          <p:spPr>
+            <a:xfrm>
+              <a:off x="3418192" y="3583969"/>
+              <a:ext cx="1216858" cy="276999"/>
+            </a:xfrm>
+            <a:prstGeom prst="rect">
+              <a:avLst/>
+            </a:prstGeom>
+            <a:noFill/>
+          </p:spPr>
+          <p:txBody>
+            <a:bodyPr wrap="square" rtlCol="0">
+              <a:spAutoFit/>
+            </a:bodyPr>
+            <a:lstStyle/>
+            <a:p>
+              <a:pPr algn="ctr"/>
+              <a:r>
+                <a:rPr lang="en-US" sz="1200" b="1" dirty="0">
+                  <a:solidFill>
+                    <a:schemeClr val="bg1"/>
+                  </a:solidFill>
+                </a:rPr>
+                <a:t>Battery: 100%</a:t>
+              </a:r>
+            </a:p>
+          </p:txBody>
+        </p:sp>
+        <p:sp>
+          <p:nvSpPr>
+            <p:cNvPr id="27" name="TextBox 26">
+              <a:extLst>
+                <a:ext uri="{FF2B5EF4-FFF2-40B4-BE49-F238E27FC236}">
+                  <a16:creationId xmlns:a16="http://schemas.microsoft.com/office/drawing/2014/main" id="{2DADCDEC-557F-33F8-7E9D-D65B30A180B6}"/>
+                </a:ext>
+              </a:extLst>
+            </p:cNvPr>
+            <p:cNvSpPr txBox="1"/>
+            <p:nvPr/>
+          </p:nvSpPr>
+          <p:spPr>
+            <a:xfrm>
+              <a:off x="3407163" y="3772194"/>
+              <a:ext cx="1216858" cy="261610"/>
+            </a:xfrm>
+            <a:prstGeom prst="rect">
+              <a:avLst/>
+            </a:prstGeom>
+            <a:noFill/>
+          </p:spPr>
+          <p:txBody>
+            <a:bodyPr wrap="square" rtlCol="0">
+              <a:spAutoFit/>
+            </a:bodyPr>
+            <a:lstStyle/>
+            <a:p>
+              <a:pPr algn="ctr"/>
+              <a:r>
+                <a:rPr lang="en-US" sz="1050" b="1" dirty="0">
+                  <a:solidFill>
+                    <a:schemeClr val="accent6"/>
+                  </a:solidFill>
+                </a:rPr>
+                <a:t>Net: +200W</a:t>
+              </a:r>
+            </a:p>
+          </p:txBody>
+        </p:sp>
+        <p:sp>
+          <p:nvSpPr>
+            <p:cNvPr id="28" name="TextBox 27">
+              <a:extLst>
+                <a:ext uri="{FF2B5EF4-FFF2-40B4-BE49-F238E27FC236}">
+                  <a16:creationId xmlns:a16="http://schemas.microsoft.com/office/drawing/2014/main" id="{E6D95DC5-79DD-9D93-CC83-0F125F4E32B9}"/>
+                </a:ext>
+              </a:extLst>
+            </p:cNvPr>
+            <p:cNvSpPr txBox="1"/>
+            <p:nvPr/>
+          </p:nvSpPr>
+          <p:spPr>
+            <a:xfrm>
+              <a:off x="3431893" y="4010873"/>
+              <a:ext cx="1216858" cy="230832"/>
+            </a:xfrm>
+            <a:prstGeom prst="rect">
+              <a:avLst/>
+            </a:prstGeom>
+            <a:noFill/>
+          </p:spPr>
+          <p:txBody>
+            <a:bodyPr wrap="square" rtlCol="0">
+              <a:spAutoFit/>
+            </a:bodyPr>
+            <a:lstStyle/>
+            <a:p>
+              <a:pPr algn="ctr"/>
+              <a:r>
+                <a:rPr lang="en-US" sz="900" b="1" dirty="0">
+                  <a:solidFill>
+                    <a:schemeClr val="bg1"/>
+                  </a:solidFill>
+                </a:rPr>
+                <a:t>Active: AC, DC, Light</a:t>
+              </a:r>
+            </a:p>
+          </p:txBody>
+        </p:sp>
+        <p:grpSp>
+          <p:nvGrpSpPr>
+            <p:cNvPr id="30" name="Group 29">
+              <a:extLst>
+                <a:ext uri="{FF2B5EF4-FFF2-40B4-BE49-F238E27FC236}">
+                  <a16:creationId xmlns:a16="http://schemas.microsoft.com/office/drawing/2014/main" id="{237989E2-7DF9-4C8B-5806-D444531D183B}"/>
+                </a:ext>
+              </a:extLst>
+            </p:cNvPr>
+            <p:cNvGrpSpPr/>
+            <p:nvPr/>
+          </p:nvGrpSpPr>
+          <p:grpSpPr>
+            <a:xfrm>
+              <a:off x="2328557" y="253814"/>
+              <a:ext cx="1295420" cy="1295420"/>
+              <a:chOff x="2329508" y="1349121"/>
+              <a:chExt cx="1572100" cy="1572100"/>
+            </a:xfrm>
+          </p:grpSpPr>
+          <p:sp>
+            <p:nvSpPr>
+              <p:cNvPr id="31" name="Rectangle: Rounded Corners 30">
+                <a:extLst>
+                  <a:ext uri="{FF2B5EF4-FFF2-40B4-BE49-F238E27FC236}">
+                    <a16:creationId xmlns:a16="http://schemas.microsoft.com/office/drawing/2014/main" id="{098396F8-0377-F763-B58D-1A4A40254000}"/>
+                  </a:ext>
+                </a:extLst>
+              </p:cNvPr>
+              <p:cNvSpPr/>
+              <p:nvPr/>
+            </p:nvSpPr>
+            <p:spPr>
+              <a:xfrm>
+                <a:off x="2441542" y="1461155"/>
+                <a:ext cx="1348033" cy="1348033"/>
+              </a:xfrm>
+              <a:prstGeom prst="roundRect">
+                <a:avLst/>
+              </a:prstGeom>
+              <a:solidFill>
+                <a:schemeClr val="bg1"/>
+              </a:solidFill>
+              <a:effectLst>
+                <a:outerShdw blurRad="177800" dist="38100" dir="5400000" sx="103000" sy="103000" algn="t" rotWithShape="0">
+                  <a:prstClr val="black">
+                    <a:alpha val="40000"/>
+                  </a:prstClr>
+                </a:outerShdw>
+              </a:effectLst>
+            </p:spPr>
+            <p:style>
+              <a:lnRef idx="2">
+                <a:schemeClr val="accent1">
+                  <a:shade val="15000"/>
+                </a:schemeClr>
+              </a:lnRef>
+              <a:fillRef idx="1">
+                <a:schemeClr val="accent1"/>
+              </a:fillRef>
+              <a:effectRef idx="0">
+                <a:schemeClr val="accent1"/>
+              </a:effectRef>
+              <a:fontRef idx="minor">
+                <a:schemeClr val="lt1"/>
+              </a:fontRef>
+            </p:style>
+            <p:txBody>
+              <a:bodyPr rtlCol="0" anchor="ctr"/>
+              <a:lstStyle/>
+              <a:p>
+                <a:pPr algn="ctr"/>
+                <a:endParaRPr lang="en-US"/>
+              </a:p>
+            </p:txBody>
+          </p:sp>
+          <p:pic>
+            <p:nvPicPr>
+              <p:cNvPr id="32" name="Picture 31">
+                <a:extLst>
+                  <a:ext uri="{FF2B5EF4-FFF2-40B4-BE49-F238E27FC236}">
+                    <a16:creationId xmlns:a16="http://schemas.microsoft.com/office/drawing/2014/main" id="{24DBBA32-3F2E-8E54-0CEB-C056C826A890}"/>
+                  </a:ext>
+                </a:extLst>
+              </p:cNvPr>
+              <p:cNvPicPr>
+                <a:picLocks noChangeAspect="1"/>
+              </p:cNvPicPr>
+              <p:nvPr/>
+            </p:nvPicPr>
+            <p:blipFill>
+              <a:blip r:embed="rId6">
+                <a:extLst>
+                  <a:ext uri="{28A0092B-C50C-407E-A947-70E740481C1C}">
+                    <a14:useLocalDpi xmlns:a14="http://schemas.microsoft.com/office/drawing/2010/main" val="0"/>
+                  </a:ext>
+                </a:extLst>
+              </a:blip>
+              <a:stretch>
+                <a:fillRect/>
+              </a:stretch>
+            </p:blipFill>
+            <p:spPr>
+              <a:xfrm>
+                <a:off x="2329508" y="1349121"/>
+                <a:ext cx="1572100" cy="1572100"/>
+              </a:xfrm>
+              <a:prstGeom prst="rect">
+                <a:avLst/>
+              </a:prstGeom>
+            </p:spPr>
+          </p:pic>
+        </p:grpSp>
+        <p:sp>
+          <p:nvSpPr>
+            <p:cNvPr id="33" name="TextBox 32">
+              <a:extLst>
+                <a:ext uri="{FF2B5EF4-FFF2-40B4-BE49-F238E27FC236}">
+                  <a16:creationId xmlns:a16="http://schemas.microsoft.com/office/drawing/2014/main" id="{D0E5E19C-E6CB-9990-6184-F70C23AAC402}"/>
+                </a:ext>
+              </a:extLst>
+            </p:cNvPr>
+            <p:cNvSpPr txBox="1"/>
+            <p:nvPr/>
+          </p:nvSpPr>
+          <p:spPr>
+            <a:xfrm>
+              <a:off x="2316983" y="1592665"/>
+              <a:ext cx="1318567" cy="307777"/>
+            </a:xfrm>
+            <a:prstGeom prst="rect">
+              <a:avLst/>
+            </a:prstGeom>
+            <a:noFill/>
+          </p:spPr>
+          <p:txBody>
+            <a:bodyPr wrap="none" rtlCol="0">
+              <a:spAutoFit/>
+            </a:bodyPr>
+            <a:lstStyle/>
+            <a:p>
+              <a:pPr algn="ctr"/>
+              <a:r>
+                <a:rPr lang="en-US" sz="1400" dirty="0"/>
+                <a:t>Home Assistant</a:t>
+              </a:r>
+            </a:p>
+          </p:txBody>
+        </p:sp>
+      </p:grpSp>
+    </p:spTree>
+    <p:extLst>
+      <p:ext uri="{BB962C8B-B14F-4D97-AF65-F5344CB8AC3E}">
+        <p14:creationId xmlns:p14="http://schemas.microsoft.com/office/powerpoint/2010/main" val="3101524830"/>
+      </p:ext>
+    </p:extLst>
+  </p:cSld>
+  <p:clrMapOvr>
+    <a:masterClrMapping/>
+  </p:clrMapOvr>
+</p:sld>
+</file>
+
 <file path=ppt/theme/theme1.xml><?xml version="1.0" encoding="utf-8"?>
 <a:theme xmlns:a="http://schemas.openxmlformats.org/drawingml/2006/main" name="Office Theme">
   <a:themeElements>

</xml_diff>